<commit_message>
update powerpoint with github link
</commit_message>
<xml_diff>
--- a/resources/frp chat.pptx
+++ b/resources/frp chat.pptx
@@ -1,24 +1,25 @@
 
 <file path=ppt/presentation.xml><?xml version="1.0" encoding="utf-8"?>
-<p:presentation xmlns:a="http://schemas.openxmlformats.org/drawingml/2006/main" xmlns:r="http://schemas.openxmlformats.org/officeDocument/2006/relationships" xmlns:mc="http://schemas.openxmlformats.org/markup-compatibility/2006" xmlns:mv="urn:schemas-microsoft-com:mac:vml" xmlns:p="http://schemas.openxmlformats.org/presentationml/2006/main" xmlns:c="http://schemas.openxmlformats.org/drawingml/2006/chart" xmlns:dgm="http://schemas.openxmlformats.org/drawingml/2006/diagram" xmlns:o="urn:schemas-microsoft-com:office:office" xmlns:v="urn:schemas-microsoft-com:vml" xmlns:pvml="urn:schemas-microsoft-com:office:powerpoint" xmlns:com="http://schemas.openxmlformats.org/drawingml/2006/compatibility" xmlns:p14="http://schemas.microsoft.com/office/powerpoint/2010/main" autoCompressPictures="0" strictFirstAndLastChars="0" saveSubsetFonts="1">
+<p:presentation xmlns:a="http://schemas.openxmlformats.org/drawingml/2006/main" xmlns:r="http://schemas.openxmlformats.org/officeDocument/2006/relationships" xmlns:p="http://schemas.openxmlformats.org/presentationml/2006/main" strictFirstAndLastChars="0" saveSubsetFonts="1" autoCompressPictures="0">
   <p:sldMasterIdLst>
-    <p:sldMasterId id="2147483654" r:id="rId4"/>
+    <p:sldMasterId id="2147483654" r:id="rId1"/>
   </p:sldMasterIdLst>
   <p:notesMasterIdLst>
-    <p:notesMasterId r:id="rId5"/>
+    <p:notesMasterId r:id="rId9"/>
   </p:notesMasterIdLst>
   <p:sldIdLst>
-    <p:sldId id="256" r:id="rId6"/>
-    <p:sldId id="257" r:id="rId7"/>
-    <p:sldId id="258" r:id="rId8"/>
-    <p:sldId id="259" r:id="rId9"/>
-    <p:sldId id="260" r:id="rId10"/>
-    <p:sldId id="261" r:id="rId11"/>
+    <p:sldId id="256" r:id="rId2"/>
+    <p:sldId id="257" r:id="rId3"/>
+    <p:sldId id="258" r:id="rId4"/>
+    <p:sldId id="259" r:id="rId5"/>
+    <p:sldId id="260" r:id="rId6"/>
+    <p:sldId id="261" r:id="rId7"/>
+    <p:sldId id="262" r:id="rId8"/>
   </p:sldIdLst>
-  <p:sldSz cy="5143500" cx="9144000"/>
+  <p:sldSz cx="9144000" cy="5143500" type="screen16x9"/>
   <p:notesSz cx="6858000" cy="9144000"/>
   <p:defaultTextStyle>
-    <a:defPPr marR="0" rtl="0" algn="l">
+    <a:defPPr marR="0" algn="l" rtl="0">
       <a:lnSpc>
         <a:spcPct val="100000"/>
       </a:lnSpc>
@@ -29,7 +30,7 @@
         <a:spcPts val="0"/>
       </a:spcAft>
     </a:defPPr>
-    <a:lvl1pPr marR="0" rtl="0" algn="l">
+    <a:lvl1pPr marR="0" algn="l" rtl="0">
       <a:lnSpc>
         <a:spcPct val="100000"/>
       </a:lnSpc>
@@ -40,7 +41,7 @@
         <a:spcPts val="0"/>
       </a:spcAft>
       <a:buNone/>
-      <a:defRPr b="0" baseline="0" i="0" sz="1400" u="none" cap="none" strike="noStrike">
+      <a:defRPr sz="1400" b="0" i="0" u="none" strike="noStrike" cap="none" baseline="0">
         <a:solidFill>
           <a:srgbClr val="000000"/>
         </a:solidFill>
@@ -51,7 +52,7 @@
         <a:rtl val="0"/>
       </a:defRPr>
     </a:lvl1pPr>
-    <a:lvl2pPr marR="0" rtl="0" algn="l">
+    <a:lvl2pPr marR="0" algn="l" rtl="0">
       <a:lnSpc>
         <a:spcPct val="100000"/>
       </a:lnSpc>
@@ -62,7 +63,7 @@
         <a:spcPts val="0"/>
       </a:spcAft>
       <a:buNone/>
-      <a:defRPr b="0" baseline="0" i="0" sz="1400" u="none" cap="none" strike="noStrike">
+      <a:defRPr sz="1400" b="0" i="0" u="none" strike="noStrike" cap="none" baseline="0">
         <a:solidFill>
           <a:srgbClr val="000000"/>
         </a:solidFill>
@@ -73,7 +74,7 @@
         <a:rtl val="0"/>
       </a:defRPr>
     </a:lvl2pPr>
-    <a:lvl3pPr marR="0" rtl="0" algn="l">
+    <a:lvl3pPr marR="0" algn="l" rtl="0">
       <a:lnSpc>
         <a:spcPct val="100000"/>
       </a:lnSpc>
@@ -84,7 +85,7 @@
         <a:spcPts val="0"/>
       </a:spcAft>
       <a:buNone/>
-      <a:defRPr b="0" baseline="0" i="0" sz="1400" u="none" cap="none" strike="noStrike">
+      <a:defRPr sz="1400" b="0" i="0" u="none" strike="noStrike" cap="none" baseline="0">
         <a:solidFill>
           <a:srgbClr val="000000"/>
         </a:solidFill>
@@ -95,7 +96,7 @@
         <a:rtl val="0"/>
       </a:defRPr>
     </a:lvl3pPr>
-    <a:lvl4pPr marR="0" rtl="0" algn="l">
+    <a:lvl4pPr marR="0" algn="l" rtl="0">
       <a:lnSpc>
         <a:spcPct val="100000"/>
       </a:lnSpc>
@@ -106,7 +107,7 @@
         <a:spcPts val="0"/>
       </a:spcAft>
       <a:buNone/>
-      <a:defRPr b="0" baseline="0" i="0" sz="1400" u="none" cap="none" strike="noStrike">
+      <a:defRPr sz="1400" b="0" i="0" u="none" strike="noStrike" cap="none" baseline="0">
         <a:solidFill>
           <a:srgbClr val="000000"/>
         </a:solidFill>
@@ -117,7 +118,7 @@
         <a:rtl val="0"/>
       </a:defRPr>
     </a:lvl4pPr>
-    <a:lvl5pPr marR="0" rtl="0" algn="l">
+    <a:lvl5pPr marR="0" algn="l" rtl="0">
       <a:lnSpc>
         <a:spcPct val="100000"/>
       </a:lnSpc>
@@ -128,7 +129,7 @@
         <a:spcPts val="0"/>
       </a:spcAft>
       <a:buNone/>
-      <a:defRPr b="0" baseline="0" i="0" sz="1400" u="none" cap="none" strike="noStrike">
+      <a:defRPr sz="1400" b="0" i="0" u="none" strike="noStrike" cap="none" baseline="0">
         <a:solidFill>
           <a:srgbClr val="000000"/>
         </a:solidFill>
@@ -139,7 +140,7 @@
         <a:rtl val="0"/>
       </a:defRPr>
     </a:lvl5pPr>
-    <a:lvl6pPr marR="0" rtl="0" algn="l">
+    <a:lvl6pPr marR="0" algn="l" rtl="0">
       <a:lnSpc>
         <a:spcPct val="100000"/>
       </a:lnSpc>
@@ -150,7 +151,7 @@
         <a:spcPts val="0"/>
       </a:spcAft>
       <a:buNone/>
-      <a:defRPr b="0" baseline="0" i="0" sz="1400" u="none" cap="none" strike="noStrike">
+      <a:defRPr sz="1400" b="0" i="0" u="none" strike="noStrike" cap="none" baseline="0">
         <a:solidFill>
           <a:srgbClr val="000000"/>
         </a:solidFill>
@@ -161,7 +162,7 @@
         <a:rtl val="0"/>
       </a:defRPr>
     </a:lvl6pPr>
-    <a:lvl7pPr marR="0" rtl="0" algn="l">
+    <a:lvl7pPr marR="0" algn="l" rtl="0">
       <a:lnSpc>
         <a:spcPct val="100000"/>
       </a:lnSpc>
@@ -172,7 +173,7 @@
         <a:spcPts val="0"/>
       </a:spcAft>
       <a:buNone/>
-      <a:defRPr b="0" baseline="0" i="0" sz="1400" u="none" cap="none" strike="noStrike">
+      <a:defRPr sz="1400" b="0" i="0" u="none" strike="noStrike" cap="none" baseline="0">
         <a:solidFill>
           <a:srgbClr val="000000"/>
         </a:solidFill>
@@ -183,7 +184,7 @@
         <a:rtl val="0"/>
       </a:defRPr>
     </a:lvl7pPr>
-    <a:lvl8pPr marR="0" rtl="0" algn="l">
+    <a:lvl8pPr marR="0" algn="l" rtl="0">
       <a:lnSpc>
         <a:spcPct val="100000"/>
       </a:lnSpc>
@@ -194,7 +195,7 @@
         <a:spcPts val="0"/>
       </a:spcAft>
       <a:buNone/>
-      <a:defRPr b="0" baseline="0" i="0" sz="1400" u="none" cap="none" strike="noStrike">
+      <a:defRPr sz="1400" b="0" i="0" u="none" strike="noStrike" cap="none" baseline="0">
         <a:solidFill>
           <a:srgbClr val="000000"/>
         </a:solidFill>
@@ -205,7 +206,7 @@
         <a:rtl val="0"/>
       </a:defRPr>
     </a:lvl8pPr>
-    <a:lvl9pPr marR="0" rtl="0" algn="l">
+    <a:lvl9pPr marR="0" algn="l" rtl="0">
       <a:lnSpc>
         <a:spcPct val="100000"/>
       </a:lnSpc>
@@ -216,7 +217,7 @@
         <a:spcPts val="0"/>
       </a:spcAft>
       <a:buNone/>
-      <a:defRPr b="0" baseline="0" i="0" sz="1400" u="none" cap="none" strike="noStrike">
+      <a:defRPr sz="1400" b="0" i="0" u="none" strike="noStrike" cap="none" baseline="0">
         <a:solidFill>
           <a:srgbClr val="000000"/>
         </a:solidFill>
@@ -232,8 +233,13 @@
 </file>
 
 <file path=ppt/notesMasters/notesMaster1.xml><?xml version="1.0" encoding="utf-8"?>
-<p:notesMaster xmlns:a="http://schemas.openxmlformats.org/drawingml/2006/main" xmlns:r="http://schemas.openxmlformats.org/officeDocument/2006/relationships" xmlns:mc="http://schemas.openxmlformats.org/markup-compatibility/2006" xmlns:mv="urn:schemas-microsoft-com:mac:vml" xmlns:p="http://schemas.openxmlformats.org/presentationml/2006/main" xmlns:c="http://schemas.openxmlformats.org/drawingml/2006/chart" xmlns:dgm="http://schemas.openxmlformats.org/drawingml/2006/diagram" xmlns:o="urn:schemas-microsoft-com:office:office" xmlns:v="urn:schemas-microsoft-com:vml" xmlns:pvml="urn:schemas-microsoft-com:office:powerpoint" xmlns:com="http://schemas.openxmlformats.org/drawingml/2006/compatibility" xmlns:p14="http://schemas.microsoft.com/office/powerpoint/2010/main">
+<p:notesMaster xmlns:a="http://schemas.openxmlformats.org/drawingml/2006/main" xmlns:r="http://schemas.openxmlformats.org/officeDocument/2006/relationships" xmlns:p="http://schemas.openxmlformats.org/presentationml/2006/main">
   <p:cSld>
+    <p:bg>
+      <p:bgRef idx="1001">
+        <a:schemeClr val="bg1"/>
+      </p:bgRef>
+    </p:bg>
     <p:spTree>
       <p:nvGrpSpPr>
         <p:cNvPr id="1" name="Shape 1"/>
@@ -251,9 +257,11 @@
       <p:sp>
         <p:nvSpPr>
           <p:cNvPr id="2" name="Shape 2"/>
-          <p:cNvSpPr/>
+          <p:cNvSpPr>
+            <a:spLocks noGrp="1" noRot="1" noChangeAspect="1"/>
+          </p:cNvSpPr>
           <p:nvPr>
-            <p:ph idx="2" type="sldImg"/>
+            <p:ph type="sldImg" idx="2"/>
           </p:nvPr>
         </p:nvSpPr>
         <p:spPr>
@@ -262,8 +270,13 @@
             <a:ext cx="6096299" cy="3429000"/>
           </a:xfrm>
           <a:custGeom>
+            <a:avLst/>
+            <a:gdLst/>
+            <a:ahLst/>
+            <a:cxnLst/>
+            <a:rect l="0" t="0" r="0" b="0"/>
             <a:pathLst>
-              <a:path extrusionOk="0" h="120000" w="120000">
+              <a:path w="120000" h="120000" extrusionOk="0">
                 <a:moveTo>
                   <a:pt x="0" y="0"/>
                 </a:moveTo>
@@ -281,23 +294,25 @@
             </a:pathLst>
           </a:custGeom>
           <a:noFill/>
-          <a:ln cap="flat" w="9525">
+          <a:ln w="9525" cap="flat">
             <a:solidFill>
               <a:srgbClr val="000000"/>
             </a:solidFill>
             <a:prstDash val="solid"/>
             <a:round/>
-            <a:headEnd len="med" w="med" type="none"/>
-            <a:tailEnd len="med" w="med" type="none"/>
+            <a:headEnd type="none" w="med" len="med"/>
+            <a:tailEnd type="none" w="med" len="med"/>
           </a:ln>
         </p:spPr>
       </p:sp>
       <p:sp>
         <p:nvSpPr>
           <p:cNvPr id="3" name="Shape 3"/>
-          <p:cNvSpPr txBox="1"/>
+          <p:cNvSpPr txBox="1">
+            <a:spLocks noGrp="1"/>
+          </p:cNvSpPr>
           <p:nvPr>
-            <p:ph idx="1" type="body"/>
+            <p:ph type="body" idx="1"/>
           </p:nvPr>
         </p:nvSpPr>
         <p:spPr>
@@ -314,7 +329,7 @@
           </a:ln>
         </p:spPr>
         <p:txBody>
-          <a:bodyPr anchorCtr="0" anchor="t" bIns="91425" lIns="91425" rIns="91425" tIns="91425"/>
+          <a:bodyPr lIns="91425" tIns="91425" rIns="91425" bIns="91425" anchor="t" anchorCtr="0"/>
           <a:lstStyle>
             <a:lvl1pPr>
               <a:spcBef>
@@ -371,21 +386,120 @@
               <a:defRPr sz="1100"/>
             </a:lvl9pPr>
           </a:lstStyle>
-          <a:p/>
+          <a:p>
+            <a:endParaRPr/>
+          </a:p>
         </p:txBody>
       </p:sp>
     </p:spTree>
+    <p:extLst>
+      <p:ext uri="{BB962C8B-B14F-4D97-AF65-F5344CB8AC3E}">
+        <p14:creationId xmlns:p14="http://schemas.microsoft.com/office/powerpoint/2010/main" val="3260259591"/>
+      </p:ext>
+    </p:extLst>
   </p:cSld>
-  <p:clrMap accent1="accent1" accent2="accent2" accent3="accent3" accent4="accent4" accent5="accent5" accent6="accent6" bg1="lt1" bg2="dk2" tx1="dk1" tx2="lt2" folHlink="folHlink" hlink="hlink"/>
+  <p:clrMap bg1="lt1" tx1="dk1" bg2="dk2" tx2="lt2" accent1="accent1" accent2="accent2" accent3="accent3" accent4="accent4" accent5="accent5" accent6="accent6" hlink="hlink" folHlink="folHlink"/>
+  <p:notesStyle>
+    <a:lvl1pPr marL="0" algn="l" defTabSz="457200" rtl="0" eaLnBrk="1" latinLnBrk="0" hangingPunct="1">
+      <a:defRPr sz="1200" kern="1200">
+        <a:solidFill>
+          <a:schemeClr val="tx1"/>
+        </a:solidFill>
+        <a:latin typeface="+mn-lt"/>
+        <a:ea typeface="+mn-ea"/>
+        <a:cs typeface="+mn-cs"/>
+      </a:defRPr>
+    </a:lvl1pPr>
+    <a:lvl2pPr marL="457200" algn="l" defTabSz="457200" rtl="0" eaLnBrk="1" latinLnBrk="0" hangingPunct="1">
+      <a:defRPr sz="1200" kern="1200">
+        <a:solidFill>
+          <a:schemeClr val="tx1"/>
+        </a:solidFill>
+        <a:latin typeface="+mn-lt"/>
+        <a:ea typeface="+mn-ea"/>
+        <a:cs typeface="+mn-cs"/>
+      </a:defRPr>
+    </a:lvl2pPr>
+    <a:lvl3pPr marL="914400" algn="l" defTabSz="457200" rtl="0" eaLnBrk="1" latinLnBrk="0" hangingPunct="1">
+      <a:defRPr sz="1200" kern="1200">
+        <a:solidFill>
+          <a:schemeClr val="tx1"/>
+        </a:solidFill>
+        <a:latin typeface="+mn-lt"/>
+        <a:ea typeface="+mn-ea"/>
+        <a:cs typeface="+mn-cs"/>
+      </a:defRPr>
+    </a:lvl3pPr>
+    <a:lvl4pPr marL="1371600" algn="l" defTabSz="457200" rtl="0" eaLnBrk="1" latinLnBrk="0" hangingPunct="1">
+      <a:defRPr sz="1200" kern="1200">
+        <a:solidFill>
+          <a:schemeClr val="tx1"/>
+        </a:solidFill>
+        <a:latin typeface="+mn-lt"/>
+        <a:ea typeface="+mn-ea"/>
+        <a:cs typeface="+mn-cs"/>
+      </a:defRPr>
+    </a:lvl4pPr>
+    <a:lvl5pPr marL="1828800" algn="l" defTabSz="457200" rtl="0" eaLnBrk="1" latinLnBrk="0" hangingPunct="1">
+      <a:defRPr sz="1200" kern="1200">
+        <a:solidFill>
+          <a:schemeClr val="tx1"/>
+        </a:solidFill>
+        <a:latin typeface="+mn-lt"/>
+        <a:ea typeface="+mn-ea"/>
+        <a:cs typeface="+mn-cs"/>
+      </a:defRPr>
+    </a:lvl5pPr>
+    <a:lvl6pPr marL="2286000" algn="l" defTabSz="457200" rtl="0" eaLnBrk="1" latinLnBrk="0" hangingPunct="1">
+      <a:defRPr sz="1200" kern="1200">
+        <a:solidFill>
+          <a:schemeClr val="tx1"/>
+        </a:solidFill>
+        <a:latin typeface="+mn-lt"/>
+        <a:ea typeface="+mn-ea"/>
+        <a:cs typeface="+mn-cs"/>
+      </a:defRPr>
+    </a:lvl6pPr>
+    <a:lvl7pPr marL="2743200" algn="l" defTabSz="457200" rtl="0" eaLnBrk="1" latinLnBrk="0" hangingPunct="1">
+      <a:defRPr sz="1200" kern="1200">
+        <a:solidFill>
+          <a:schemeClr val="tx1"/>
+        </a:solidFill>
+        <a:latin typeface="+mn-lt"/>
+        <a:ea typeface="+mn-ea"/>
+        <a:cs typeface="+mn-cs"/>
+      </a:defRPr>
+    </a:lvl7pPr>
+    <a:lvl8pPr marL="3200400" algn="l" defTabSz="457200" rtl="0" eaLnBrk="1" latinLnBrk="0" hangingPunct="1">
+      <a:defRPr sz="1200" kern="1200">
+        <a:solidFill>
+          <a:schemeClr val="tx1"/>
+        </a:solidFill>
+        <a:latin typeface="+mn-lt"/>
+        <a:ea typeface="+mn-ea"/>
+        <a:cs typeface="+mn-cs"/>
+      </a:defRPr>
+    </a:lvl8pPr>
+    <a:lvl9pPr marL="3657600" algn="l" defTabSz="457200" rtl="0" eaLnBrk="1" latinLnBrk="0" hangingPunct="1">
+      <a:defRPr sz="1200" kern="1200">
+        <a:solidFill>
+          <a:schemeClr val="tx1"/>
+        </a:solidFill>
+        <a:latin typeface="+mn-lt"/>
+        <a:ea typeface="+mn-ea"/>
+        <a:cs typeface="+mn-cs"/>
+      </a:defRPr>
+    </a:lvl9pPr>
+  </p:notesStyle>
 </p:notesMaster>
 </file>
 
 <file path=ppt/notesSlides/notesSlide1.xml><?xml version="1.0" encoding="utf-8"?>
-<p:notes xmlns:a="http://schemas.openxmlformats.org/drawingml/2006/main" xmlns:r="http://schemas.openxmlformats.org/officeDocument/2006/relationships" xmlns:mc="http://schemas.openxmlformats.org/markup-compatibility/2006" xmlns:mv="urn:schemas-microsoft-com:mac:vml" xmlns:p="http://schemas.openxmlformats.org/presentationml/2006/main" xmlns:c="http://schemas.openxmlformats.org/drawingml/2006/chart" xmlns:dgm="http://schemas.openxmlformats.org/drawingml/2006/diagram" xmlns:o="urn:schemas-microsoft-com:office:office" xmlns:v="urn:schemas-microsoft-com:vml" xmlns:pvml="urn:schemas-microsoft-com:office:powerpoint" xmlns:com="http://schemas.openxmlformats.org/drawingml/2006/compatibility" xmlns:p14="http://schemas.microsoft.com/office/powerpoint/2010/main" showMasterPhAnim="0" showMasterSp="0">
+<p:notes xmlns:a="http://schemas.openxmlformats.org/drawingml/2006/main" xmlns:r="http://schemas.openxmlformats.org/officeDocument/2006/relationships" xmlns:p="http://schemas.openxmlformats.org/presentationml/2006/main" showMasterSp="0" showMasterPhAnim="0">
   <p:cSld>
     <p:spTree>
       <p:nvGrpSpPr>
-        <p:cNvPr id="32" name="Shape 32"/>
+        <p:cNvPr id="1" name="Shape 32"/>
         <p:cNvGrpSpPr/>
         <p:nvPr/>
       </p:nvGrpSpPr>
@@ -400,9 +514,11 @@
       <p:sp>
         <p:nvSpPr>
           <p:cNvPr id="33" name="Shape 33"/>
-          <p:cNvSpPr/>
+          <p:cNvSpPr>
+            <a:spLocks noGrp="1" noRot="1" noChangeAspect="1"/>
+          </p:cNvSpPr>
           <p:nvPr>
-            <p:ph idx="2" type="sldImg"/>
+            <p:ph type="sldImg" idx="2"/>
           </p:nvPr>
         </p:nvSpPr>
         <p:spPr>
@@ -411,8 +527,13 @@
             <a:ext cx="6096299" cy="3429000"/>
           </a:xfrm>
           <a:custGeom>
+            <a:avLst/>
+            <a:gdLst/>
+            <a:ahLst/>
+            <a:cxnLst/>
+            <a:rect l="0" t="0" r="0" b="0"/>
             <a:pathLst>
-              <a:path extrusionOk="0" h="120000" w="120000">
+              <a:path w="120000" h="120000" extrusionOk="0">
                 <a:moveTo>
                   <a:pt x="0" y="0"/>
                 </a:moveTo>
@@ -430,23 +551,25 @@
             </a:pathLst>
           </a:custGeom>
           <a:noFill/>
-          <a:ln cap="flat" w="9525">
+          <a:ln w="9525" cap="flat">
             <a:solidFill>
               <a:srgbClr val="000000"/>
             </a:solidFill>
             <a:prstDash val="solid"/>
             <a:round/>
-            <a:headEnd len="med" w="med" type="none"/>
-            <a:tailEnd len="med" w="med" type="none"/>
+            <a:headEnd type="none" w="med" len="med"/>
+            <a:tailEnd type="none" w="med" len="med"/>
           </a:ln>
         </p:spPr>
       </p:sp>
       <p:sp>
         <p:nvSpPr>
           <p:cNvPr id="34" name="Shape 34"/>
-          <p:cNvSpPr txBox="1"/>
+          <p:cNvSpPr txBox="1">
+            <a:spLocks noGrp="1"/>
+          </p:cNvSpPr>
           <p:nvPr>
-            <p:ph idx="1" type="body"/>
+            <p:ph type="body" idx="1"/>
           </p:nvPr>
         </p:nvSpPr>
         <p:spPr>
@@ -459,7 +582,7 @@
           </a:prstGeom>
         </p:spPr>
         <p:txBody>
-          <a:bodyPr anchorCtr="0" anchor="t" bIns="91425" lIns="91425" rIns="91425" tIns="91425">
+          <a:bodyPr lIns="91425" tIns="91425" rIns="91425" bIns="91425" anchor="t" anchorCtr="0">
             <a:noAutofit/>
           </a:bodyPr>
           <a:lstStyle/>
@@ -470,9 +593,6 @@
               </a:spcBef>
               <a:buNone/>
             </a:pPr>
-            <a:r>
-              <a:t/>
-            </a:r>
             <a:endParaRPr/>
           </a:p>
         </p:txBody>
@@ -486,11 +606,11 @@
 </file>
 
 <file path=ppt/notesSlides/notesSlide2.xml><?xml version="1.0" encoding="utf-8"?>
-<p:notes xmlns:a="http://schemas.openxmlformats.org/drawingml/2006/main" xmlns:r="http://schemas.openxmlformats.org/officeDocument/2006/relationships" xmlns:mc="http://schemas.openxmlformats.org/markup-compatibility/2006" xmlns:mv="urn:schemas-microsoft-com:mac:vml" xmlns:p="http://schemas.openxmlformats.org/presentationml/2006/main" xmlns:c="http://schemas.openxmlformats.org/drawingml/2006/chart" xmlns:dgm="http://schemas.openxmlformats.org/drawingml/2006/diagram" xmlns:o="urn:schemas-microsoft-com:office:office" xmlns:v="urn:schemas-microsoft-com:vml" xmlns:pvml="urn:schemas-microsoft-com:office:powerpoint" xmlns:com="http://schemas.openxmlformats.org/drawingml/2006/compatibility" xmlns:p14="http://schemas.microsoft.com/office/powerpoint/2010/main" showMasterPhAnim="0" showMasterSp="0">
+<p:notes xmlns:a="http://schemas.openxmlformats.org/drawingml/2006/main" xmlns:r="http://schemas.openxmlformats.org/officeDocument/2006/relationships" xmlns:p="http://schemas.openxmlformats.org/presentationml/2006/main" showMasterSp="0" showMasterPhAnim="0">
   <p:cSld>
     <p:spTree>
       <p:nvGrpSpPr>
-        <p:cNvPr id="38" name="Shape 38"/>
+        <p:cNvPr id="1" name="Shape 38"/>
         <p:cNvGrpSpPr/>
         <p:nvPr/>
       </p:nvGrpSpPr>
@@ -505,9 +625,11 @@
       <p:sp>
         <p:nvSpPr>
           <p:cNvPr id="39" name="Shape 39"/>
-          <p:cNvSpPr/>
+          <p:cNvSpPr>
+            <a:spLocks noGrp="1" noRot="1" noChangeAspect="1"/>
+          </p:cNvSpPr>
           <p:nvPr>
-            <p:ph idx="2" type="sldImg"/>
+            <p:ph type="sldImg" idx="2"/>
           </p:nvPr>
         </p:nvSpPr>
         <p:spPr>
@@ -516,8 +638,13 @@
             <a:ext cx="6096299" cy="3429000"/>
           </a:xfrm>
           <a:custGeom>
+            <a:avLst/>
+            <a:gdLst/>
+            <a:ahLst/>
+            <a:cxnLst/>
+            <a:rect l="0" t="0" r="0" b="0"/>
             <a:pathLst>
-              <a:path extrusionOk="0" h="120000" w="120000">
+              <a:path w="120000" h="120000" extrusionOk="0">
                 <a:moveTo>
                   <a:pt x="0" y="0"/>
                 </a:moveTo>
@@ -535,23 +662,25 @@
             </a:pathLst>
           </a:custGeom>
           <a:noFill/>
-          <a:ln cap="flat" w="9525">
+          <a:ln w="9525" cap="flat">
             <a:solidFill>
               <a:srgbClr val="000000"/>
             </a:solidFill>
             <a:prstDash val="solid"/>
             <a:round/>
-            <a:headEnd len="med" w="med" type="none"/>
-            <a:tailEnd len="med" w="med" type="none"/>
+            <a:headEnd type="none" w="med" len="med"/>
+            <a:tailEnd type="none" w="med" len="med"/>
           </a:ln>
         </p:spPr>
       </p:sp>
       <p:sp>
         <p:nvSpPr>
           <p:cNvPr id="40" name="Shape 40"/>
-          <p:cNvSpPr txBox="1"/>
+          <p:cNvSpPr txBox="1">
+            <a:spLocks noGrp="1"/>
+          </p:cNvSpPr>
           <p:nvPr>
-            <p:ph idx="1" type="body"/>
+            <p:ph type="body" idx="1"/>
           </p:nvPr>
         </p:nvSpPr>
         <p:spPr>
@@ -564,7 +693,7 @@
           </a:prstGeom>
         </p:spPr>
         <p:txBody>
-          <a:bodyPr anchorCtr="0" anchor="t" bIns="91425" lIns="91425" rIns="91425" tIns="91425">
+          <a:bodyPr lIns="91425" tIns="91425" rIns="91425" bIns="91425" anchor="t" anchorCtr="0">
             <a:noAutofit/>
           </a:bodyPr>
           <a:lstStyle/>
@@ -575,9 +704,6 @@
               </a:spcBef>
               <a:buNone/>
             </a:pPr>
-            <a:r>
-              <a:t/>
-            </a:r>
             <a:endParaRPr/>
           </a:p>
         </p:txBody>
@@ -591,11 +717,11 @@
 </file>
 
 <file path=ppt/notesSlides/notesSlide3.xml><?xml version="1.0" encoding="utf-8"?>
-<p:notes xmlns:a="http://schemas.openxmlformats.org/drawingml/2006/main" xmlns:r="http://schemas.openxmlformats.org/officeDocument/2006/relationships" xmlns:mc="http://schemas.openxmlformats.org/markup-compatibility/2006" xmlns:mv="urn:schemas-microsoft-com:mac:vml" xmlns:p="http://schemas.openxmlformats.org/presentationml/2006/main" xmlns:c="http://schemas.openxmlformats.org/drawingml/2006/chart" xmlns:dgm="http://schemas.openxmlformats.org/drawingml/2006/diagram" xmlns:o="urn:schemas-microsoft-com:office:office" xmlns:v="urn:schemas-microsoft-com:vml" xmlns:pvml="urn:schemas-microsoft-com:office:powerpoint" xmlns:com="http://schemas.openxmlformats.org/drawingml/2006/compatibility" xmlns:p14="http://schemas.microsoft.com/office/powerpoint/2010/main" showMasterPhAnim="0" showMasterSp="0">
+<p:notes xmlns:a="http://schemas.openxmlformats.org/drawingml/2006/main" xmlns:r="http://schemas.openxmlformats.org/officeDocument/2006/relationships" xmlns:p="http://schemas.openxmlformats.org/presentationml/2006/main" showMasterSp="0" showMasterPhAnim="0">
   <p:cSld>
     <p:spTree>
       <p:nvGrpSpPr>
-        <p:cNvPr id="44" name="Shape 44"/>
+        <p:cNvPr id="1" name="Shape 44"/>
         <p:cNvGrpSpPr/>
         <p:nvPr/>
       </p:nvGrpSpPr>
@@ -610,9 +736,11 @@
       <p:sp>
         <p:nvSpPr>
           <p:cNvPr id="45" name="Shape 45"/>
-          <p:cNvSpPr/>
+          <p:cNvSpPr>
+            <a:spLocks noGrp="1" noRot="1" noChangeAspect="1"/>
+          </p:cNvSpPr>
           <p:nvPr>
-            <p:ph idx="2" type="sldImg"/>
+            <p:ph type="sldImg" idx="2"/>
           </p:nvPr>
         </p:nvSpPr>
         <p:spPr>
@@ -621,8 +749,13 @@
             <a:ext cx="6096299" cy="3429000"/>
           </a:xfrm>
           <a:custGeom>
+            <a:avLst/>
+            <a:gdLst/>
+            <a:ahLst/>
+            <a:cxnLst/>
+            <a:rect l="0" t="0" r="0" b="0"/>
             <a:pathLst>
-              <a:path extrusionOk="0" h="120000" w="120000">
+              <a:path w="120000" h="120000" extrusionOk="0">
                 <a:moveTo>
                   <a:pt x="0" y="0"/>
                 </a:moveTo>
@@ -640,23 +773,25 @@
             </a:pathLst>
           </a:custGeom>
           <a:noFill/>
-          <a:ln cap="flat" w="9525">
+          <a:ln w="9525" cap="flat">
             <a:solidFill>
               <a:srgbClr val="000000"/>
             </a:solidFill>
             <a:prstDash val="solid"/>
             <a:round/>
-            <a:headEnd len="med" w="med" type="none"/>
-            <a:tailEnd len="med" w="med" type="none"/>
+            <a:headEnd type="none" w="med" len="med"/>
+            <a:tailEnd type="none" w="med" len="med"/>
           </a:ln>
         </p:spPr>
       </p:sp>
       <p:sp>
         <p:nvSpPr>
           <p:cNvPr id="46" name="Shape 46"/>
-          <p:cNvSpPr txBox="1"/>
+          <p:cNvSpPr txBox="1">
+            <a:spLocks noGrp="1"/>
+          </p:cNvSpPr>
           <p:nvPr>
-            <p:ph idx="1" type="body"/>
+            <p:ph type="body" idx="1"/>
           </p:nvPr>
         </p:nvSpPr>
         <p:spPr>
@@ -669,7 +804,7 @@
           </a:prstGeom>
         </p:spPr>
         <p:txBody>
-          <a:bodyPr anchorCtr="0" anchor="t" bIns="91425" lIns="91425" rIns="91425" tIns="91425">
+          <a:bodyPr lIns="91425" tIns="91425" rIns="91425" bIns="91425" anchor="t" anchorCtr="0">
             <a:noAutofit/>
           </a:bodyPr>
           <a:lstStyle/>
@@ -680,9 +815,6 @@
               </a:spcBef>
               <a:buNone/>
             </a:pPr>
-            <a:r>
-              <a:t/>
-            </a:r>
             <a:endParaRPr/>
           </a:p>
         </p:txBody>
@@ -696,11 +828,11 @@
 </file>
 
 <file path=ppt/notesSlides/notesSlide4.xml><?xml version="1.0" encoding="utf-8"?>
-<p:notes xmlns:a="http://schemas.openxmlformats.org/drawingml/2006/main" xmlns:r="http://schemas.openxmlformats.org/officeDocument/2006/relationships" xmlns:mc="http://schemas.openxmlformats.org/markup-compatibility/2006" xmlns:mv="urn:schemas-microsoft-com:mac:vml" xmlns:p="http://schemas.openxmlformats.org/presentationml/2006/main" xmlns:c="http://schemas.openxmlformats.org/drawingml/2006/chart" xmlns:dgm="http://schemas.openxmlformats.org/drawingml/2006/diagram" xmlns:o="urn:schemas-microsoft-com:office:office" xmlns:v="urn:schemas-microsoft-com:vml" xmlns:pvml="urn:schemas-microsoft-com:office:powerpoint" xmlns:com="http://schemas.openxmlformats.org/drawingml/2006/compatibility" xmlns:p14="http://schemas.microsoft.com/office/powerpoint/2010/main" showMasterPhAnim="0" showMasterSp="0">
+<p:notes xmlns:a="http://schemas.openxmlformats.org/drawingml/2006/main" xmlns:r="http://schemas.openxmlformats.org/officeDocument/2006/relationships" xmlns:p="http://schemas.openxmlformats.org/presentationml/2006/main" showMasterSp="0" showMasterPhAnim="0">
   <p:cSld>
     <p:spTree>
       <p:nvGrpSpPr>
-        <p:cNvPr id="50" name="Shape 50"/>
+        <p:cNvPr id="1" name="Shape 50"/>
         <p:cNvGrpSpPr/>
         <p:nvPr/>
       </p:nvGrpSpPr>
@@ -715,9 +847,11 @@
       <p:sp>
         <p:nvSpPr>
           <p:cNvPr id="51" name="Shape 51"/>
-          <p:cNvSpPr/>
+          <p:cNvSpPr>
+            <a:spLocks noGrp="1" noRot="1" noChangeAspect="1"/>
+          </p:cNvSpPr>
           <p:nvPr>
-            <p:ph idx="2" type="sldImg"/>
+            <p:ph type="sldImg" idx="2"/>
           </p:nvPr>
         </p:nvSpPr>
         <p:spPr>
@@ -726,8 +860,13 @@
             <a:ext cx="6096299" cy="3429000"/>
           </a:xfrm>
           <a:custGeom>
+            <a:avLst/>
+            <a:gdLst/>
+            <a:ahLst/>
+            <a:cxnLst/>
+            <a:rect l="0" t="0" r="0" b="0"/>
             <a:pathLst>
-              <a:path extrusionOk="0" h="120000" w="120000">
+              <a:path w="120000" h="120000" extrusionOk="0">
                 <a:moveTo>
                   <a:pt x="0" y="0"/>
                 </a:moveTo>
@@ -745,23 +884,25 @@
             </a:pathLst>
           </a:custGeom>
           <a:noFill/>
-          <a:ln cap="flat" w="9525">
+          <a:ln w="9525" cap="flat">
             <a:solidFill>
               <a:srgbClr val="000000"/>
             </a:solidFill>
             <a:prstDash val="solid"/>
             <a:round/>
-            <a:headEnd len="med" w="med" type="none"/>
-            <a:tailEnd len="med" w="med" type="none"/>
+            <a:headEnd type="none" w="med" len="med"/>
+            <a:tailEnd type="none" w="med" len="med"/>
           </a:ln>
         </p:spPr>
       </p:sp>
       <p:sp>
         <p:nvSpPr>
           <p:cNvPr id="52" name="Shape 52"/>
-          <p:cNvSpPr txBox="1"/>
+          <p:cNvSpPr txBox="1">
+            <a:spLocks noGrp="1"/>
+          </p:cNvSpPr>
           <p:nvPr>
-            <p:ph idx="1" type="body"/>
+            <p:ph type="body" idx="1"/>
           </p:nvPr>
         </p:nvSpPr>
         <p:spPr>
@@ -774,7 +915,7 @@
           </a:prstGeom>
         </p:spPr>
         <p:txBody>
-          <a:bodyPr anchorCtr="0" anchor="t" bIns="91425" lIns="91425" rIns="91425" tIns="91425">
+          <a:bodyPr lIns="91425" tIns="91425" rIns="91425" bIns="91425" anchor="t" anchorCtr="0">
             <a:noAutofit/>
           </a:bodyPr>
           <a:lstStyle/>
@@ -785,9 +926,6 @@
               </a:spcBef>
               <a:buNone/>
             </a:pPr>
-            <a:r>
-              <a:t/>
-            </a:r>
             <a:endParaRPr/>
           </a:p>
         </p:txBody>
@@ -801,11 +939,11 @@
 </file>
 
 <file path=ppt/notesSlides/notesSlide5.xml><?xml version="1.0" encoding="utf-8"?>
-<p:notes xmlns:a="http://schemas.openxmlformats.org/drawingml/2006/main" xmlns:r="http://schemas.openxmlformats.org/officeDocument/2006/relationships" xmlns:mc="http://schemas.openxmlformats.org/markup-compatibility/2006" xmlns:mv="urn:schemas-microsoft-com:mac:vml" xmlns:p="http://schemas.openxmlformats.org/presentationml/2006/main" xmlns:c="http://schemas.openxmlformats.org/drawingml/2006/chart" xmlns:dgm="http://schemas.openxmlformats.org/drawingml/2006/diagram" xmlns:o="urn:schemas-microsoft-com:office:office" xmlns:v="urn:schemas-microsoft-com:vml" xmlns:pvml="urn:schemas-microsoft-com:office:powerpoint" xmlns:com="http://schemas.openxmlformats.org/drawingml/2006/compatibility" xmlns:p14="http://schemas.microsoft.com/office/powerpoint/2010/main" showMasterPhAnim="0" showMasterSp="0">
+<p:notes xmlns:a="http://schemas.openxmlformats.org/drawingml/2006/main" xmlns:r="http://schemas.openxmlformats.org/officeDocument/2006/relationships" xmlns:p="http://schemas.openxmlformats.org/presentationml/2006/main" showMasterSp="0" showMasterPhAnim="0">
   <p:cSld>
     <p:spTree>
       <p:nvGrpSpPr>
-        <p:cNvPr id="56" name="Shape 56"/>
+        <p:cNvPr id="1" name="Shape 56"/>
         <p:cNvGrpSpPr/>
         <p:nvPr/>
       </p:nvGrpSpPr>
@@ -820,9 +958,11 @@
       <p:sp>
         <p:nvSpPr>
           <p:cNvPr id="57" name="Shape 57"/>
-          <p:cNvSpPr/>
+          <p:cNvSpPr>
+            <a:spLocks noGrp="1" noRot="1" noChangeAspect="1"/>
+          </p:cNvSpPr>
           <p:nvPr>
-            <p:ph idx="2" type="sldImg"/>
+            <p:ph type="sldImg" idx="2"/>
           </p:nvPr>
         </p:nvSpPr>
         <p:spPr>
@@ -831,8 +971,13 @@
             <a:ext cx="6096299" cy="3429000"/>
           </a:xfrm>
           <a:custGeom>
+            <a:avLst/>
+            <a:gdLst/>
+            <a:ahLst/>
+            <a:cxnLst/>
+            <a:rect l="0" t="0" r="0" b="0"/>
             <a:pathLst>
-              <a:path extrusionOk="0" h="120000" w="120000">
+              <a:path w="120000" h="120000" extrusionOk="0">
                 <a:moveTo>
                   <a:pt x="0" y="0"/>
                 </a:moveTo>
@@ -850,23 +995,25 @@
             </a:pathLst>
           </a:custGeom>
           <a:noFill/>
-          <a:ln cap="flat" w="9525">
+          <a:ln w="9525" cap="flat">
             <a:solidFill>
               <a:srgbClr val="000000"/>
             </a:solidFill>
             <a:prstDash val="solid"/>
             <a:round/>
-            <a:headEnd len="med" w="med" type="none"/>
-            <a:tailEnd len="med" w="med" type="none"/>
+            <a:headEnd type="none" w="med" len="med"/>
+            <a:tailEnd type="none" w="med" len="med"/>
           </a:ln>
         </p:spPr>
       </p:sp>
       <p:sp>
         <p:nvSpPr>
           <p:cNvPr id="58" name="Shape 58"/>
-          <p:cNvSpPr txBox="1"/>
+          <p:cNvSpPr txBox="1">
+            <a:spLocks noGrp="1"/>
+          </p:cNvSpPr>
           <p:nvPr>
-            <p:ph idx="1" type="body"/>
+            <p:ph type="body" idx="1"/>
           </p:nvPr>
         </p:nvSpPr>
         <p:spPr>
@@ -879,7 +1026,7 @@
           </a:prstGeom>
         </p:spPr>
         <p:txBody>
-          <a:bodyPr anchorCtr="0" anchor="t" bIns="91425" lIns="91425" rIns="91425" tIns="91425">
+          <a:bodyPr lIns="91425" tIns="91425" rIns="91425" bIns="91425" anchor="t" anchorCtr="0">
             <a:noAutofit/>
           </a:bodyPr>
           <a:lstStyle/>
@@ -890,9 +1037,6 @@
               </a:spcBef>
               <a:buNone/>
             </a:pPr>
-            <a:r>
-              <a:t/>
-            </a:r>
             <a:endParaRPr/>
           </a:p>
         </p:txBody>
@@ -906,11 +1050,11 @@
 </file>
 
 <file path=ppt/notesSlides/notesSlide6.xml><?xml version="1.0" encoding="utf-8"?>
-<p:notes xmlns:a="http://schemas.openxmlformats.org/drawingml/2006/main" xmlns:r="http://schemas.openxmlformats.org/officeDocument/2006/relationships" xmlns:mc="http://schemas.openxmlformats.org/markup-compatibility/2006" xmlns:mv="urn:schemas-microsoft-com:mac:vml" xmlns:p="http://schemas.openxmlformats.org/presentationml/2006/main" xmlns:c="http://schemas.openxmlformats.org/drawingml/2006/chart" xmlns:dgm="http://schemas.openxmlformats.org/drawingml/2006/diagram" xmlns:o="urn:schemas-microsoft-com:office:office" xmlns:v="urn:schemas-microsoft-com:vml" xmlns:pvml="urn:schemas-microsoft-com:office:powerpoint" xmlns:com="http://schemas.openxmlformats.org/drawingml/2006/compatibility" xmlns:p14="http://schemas.microsoft.com/office/powerpoint/2010/main" showMasterPhAnim="0" showMasterSp="0">
+<p:notes xmlns:a="http://schemas.openxmlformats.org/drawingml/2006/main" xmlns:r="http://schemas.openxmlformats.org/officeDocument/2006/relationships" xmlns:p="http://schemas.openxmlformats.org/presentationml/2006/main" showMasterSp="0" showMasterPhAnim="0">
   <p:cSld>
     <p:spTree>
       <p:nvGrpSpPr>
-        <p:cNvPr id="62" name="Shape 62"/>
+        <p:cNvPr id="1" name="Shape 62"/>
         <p:cNvGrpSpPr/>
         <p:nvPr/>
       </p:nvGrpSpPr>
@@ -925,9 +1069,11 @@
       <p:sp>
         <p:nvSpPr>
           <p:cNvPr id="63" name="Shape 63"/>
-          <p:cNvSpPr/>
+          <p:cNvSpPr>
+            <a:spLocks noGrp="1" noRot="1" noChangeAspect="1"/>
+          </p:cNvSpPr>
           <p:nvPr>
-            <p:ph idx="2" type="sldImg"/>
+            <p:ph type="sldImg" idx="2"/>
           </p:nvPr>
         </p:nvSpPr>
         <p:spPr>
@@ -936,8 +1082,13 @@
             <a:ext cx="6096299" cy="3429000"/>
           </a:xfrm>
           <a:custGeom>
+            <a:avLst/>
+            <a:gdLst/>
+            <a:ahLst/>
+            <a:cxnLst/>
+            <a:rect l="0" t="0" r="0" b="0"/>
             <a:pathLst>
-              <a:path extrusionOk="0" h="120000" w="120000">
+              <a:path w="120000" h="120000" extrusionOk="0">
                 <a:moveTo>
                   <a:pt x="0" y="0"/>
                 </a:moveTo>
@@ -955,23 +1106,25 @@
             </a:pathLst>
           </a:custGeom>
           <a:noFill/>
-          <a:ln cap="flat" w="9525">
+          <a:ln w="9525" cap="flat">
             <a:solidFill>
               <a:srgbClr val="000000"/>
             </a:solidFill>
             <a:prstDash val="solid"/>
             <a:round/>
-            <a:headEnd len="med" w="med" type="none"/>
-            <a:tailEnd len="med" w="med" type="none"/>
+            <a:headEnd type="none" w="med" len="med"/>
+            <a:tailEnd type="none" w="med" len="med"/>
           </a:ln>
         </p:spPr>
       </p:sp>
       <p:sp>
         <p:nvSpPr>
           <p:cNvPr id="64" name="Shape 64"/>
-          <p:cNvSpPr txBox="1"/>
+          <p:cNvSpPr txBox="1">
+            <a:spLocks noGrp="1"/>
+          </p:cNvSpPr>
           <p:nvPr>
-            <p:ph idx="1" type="body"/>
+            <p:ph type="body" idx="1"/>
           </p:nvPr>
         </p:nvSpPr>
         <p:spPr>
@@ -984,7 +1137,7 @@
           </a:prstGeom>
         </p:spPr>
         <p:txBody>
-          <a:bodyPr anchorCtr="0" anchor="t" bIns="91425" lIns="91425" rIns="91425" tIns="91425">
+          <a:bodyPr lIns="91425" tIns="91425" rIns="91425" bIns="91425" anchor="t" anchorCtr="0">
             <a:noAutofit/>
           </a:bodyPr>
           <a:lstStyle/>
@@ -995,9 +1148,6 @@
               </a:spcBef>
               <a:buNone/>
             </a:pPr>
-            <a:r>
-              <a:t/>
-            </a:r>
             <a:endParaRPr/>
           </a:p>
         </p:txBody>
@@ -1011,11 +1161,11 @@
 </file>
 
 <file path=ppt/slideLayouts/slideLayout1.xml><?xml version="1.0" encoding="utf-8"?>
-<p:sldLayout xmlns:a="http://schemas.openxmlformats.org/drawingml/2006/main" xmlns:r="http://schemas.openxmlformats.org/officeDocument/2006/relationships" xmlns:mc="http://schemas.openxmlformats.org/markup-compatibility/2006" xmlns:mv="urn:schemas-microsoft-com:mac:vml" xmlns:p="http://schemas.openxmlformats.org/presentationml/2006/main" xmlns:c="http://schemas.openxmlformats.org/drawingml/2006/chart" xmlns:dgm="http://schemas.openxmlformats.org/drawingml/2006/diagram" xmlns:o="urn:schemas-microsoft-com:office:office" xmlns:v="urn:schemas-microsoft-com:vml" xmlns:pvml="urn:schemas-microsoft-com:office:powerpoint" xmlns:com="http://schemas.openxmlformats.org/drawingml/2006/compatibility" xmlns:p14="http://schemas.microsoft.com/office/powerpoint/2010/main" type="title">
+<p:sldLayout xmlns:a="http://schemas.openxmlformats.org/drawingml/2006/main" xmlns:r="http://schemas.openxmlformats.org/officeDocument/2006/relationships" xmlns:p="http://schemas.openxmlformats.org/presentationml/2006/main" type="title">
   <p:cSld name="Title Slide">
     <p:spTree>
       <p:nvGrpSpPr>
-        <p:cNvPr id="8" name="Shape 8"/>
+        <p:cNvPr id="1" name="Shape 8"/>
         <p:cNvGrpSpPr/>
         <p:nvPr/>
       </p:nvGrpSpPr>
@@ -1030,9 +1180,11 @@
       <p:sp>
         <p:nvSpPr>
           <p:cNvPr id="9" name="Shape 9"/>
-          <p:cNvSpPr txBox="1"/>
+          <p:cNvSpPr txBox="1">
+            <a:spLocks noGrp="1"/>
+          </p:cNvSpPr>
           <p:nvPr>
-            <p:ph idx="1" type="subTitle"/>
+            <p:ph type="subTitle" idx="1"/>
           </p:nvPr>
         </p:nvSpPr>
         <p:spPr>
@@ -1045,7 +1197,7 @@
           </a:prstGeom>
         </p:spPr>
         <p:txBody>
-          <a:bodyPr anchorCtr="0" anchor="t" bIns="91425" lIns="91425" rIns="91425" tIns="91425"/>
+          <a:bodyPr lIns="91425" tIns="91425" rIns="91425" bIns="91425" anchor="t" anchorCtr="0"/>
           <a:lstStyle>
             <a:lvl1pPr algn="ctr">
               <a:spcBef>
@@ -1182,13 +1334,17 @@
               </a:defRPr>
             </a:lvl9pPr>
           </a:lstStyle>
-          <a:p/>
+          <a:p>
+            <a:endParaRPr/>
+          </a:p>
         </p:txBody>
       </p:sp>
       <p:sp>
         <p:nvSpPr>
           <p:cNvPr id="10" name="Shape 10"/>
-          <p:cNvSpPr txBox="1"/>
+          <p:cNvSpPr txBox="1">
+            <a:spLocks noGrp="1"/>
+          </p:cNvSpPr>
           <p:nvPr>
             <p:ph type="ctrTitle"/>
           </p:nvPr>
@@ -1203,7 +1359,7 @@
           </a:prstGeom>
         </p:spPr>
         <p:txBody>
-          <a:bodyPr anchorCtr="0" anchor="b" bIns="91425" lIns="91425" rIns="91425" tIns="91425"/>
+          <a:bodyPr lIns="91425" tIns="91425" rIns="91425" bIns="91425" anchor="b" anchorCtr="0"/>
           <a:lstStyle>
             <a:lvl1pPr algn="ctr">
               <a:spcBef>
@@ -1269,15 +1425,19 @@
               <a:defRPr sz="4800"/>
             </a:lvl9pPr>
           </a:lstStyle>
-          <a:p/>
+          <a:p>
+            <a:endParaRPr/>
+          </a:p>
         </p:txBody>
       </p:sp>
       <p:sp>
         <p:nvSpPr>
           <p:cNvPr id="11" name="Shape 11"/>
-          <p:cNvSpPr txBox="1"/>
+          <p:cNvSpPr txBox="1">
+            <a:spLocks noGrp="1"/>
+          </p:cNvSpPr>
           <p:nvPr>
-            <p:ph idx="12" type="sldNum"/>
+            <p:ph type="sldNum" idx="12"/>
           </p:nvPr>
         </p:nvSpPr>
         <p:spPr>
@@ -1290,7 +1450,7 @@
           </a:prstGeom>
         </p:spPr>
         <p:txBody>
-          <a:bodyPr anchorCtr="0" anchor="ctr" bIns="91425" lIns="91425" rIns="91425" tIns="91425">
+          <a:bodyPr lIns="91425" tIns="91425" rIns="91425" bIns="91425" anchor="ctr" anchorCtr="0">
             <a:noAutofit/>
           </a:bodyPr>
           <a:lstStyle>
@@ -1313,6 +1473,7 @@
               <a:rPr lang="en"/>
               <a:t>‹#›</a:t>
             </a:fld>
+            <a:endParaRPr lang="en"/>
           </a:p>
         </p:txBody>
       </p:sp>
@@ -1325,11 +1486,11 @@
 </file>
 
 <file path=ppt/slideLayouts/slideLayout2.xml><?xml version="1.0" encoding="utf-8"?>
-<p:sldLayout xmlns:a="http://schemas.openxmlformats.org/drawingml/2006/main" xmlns:r="http://schemas.openxmlformats.org/officeDocument/2006/relationships" xmlns:mc="http://schemas.openxmlformats.org/markup-compatibility/2006" xmlns:mv="urn:schemas-microsoft-com:mac:vml" xmlns:p="http://schemas.openxmlformats.org/presentationml/2006/main" xmlns:c="http://schemas.openxmlformats.org/drawingml/2006/chart" xmlns:dgm="http://schemas.openxmlformats.org/drawingml/2006/diagram" xmlns:o="urn:schemas-microsoft-com:office:office" xmlns:v="urn:schemas-microsoft-com:vml" xmlns:pvml="urn:schemas-microsoft-com:office:powerpoint" xmlns:com="http://schemas.openxmlformats.org/drawingml/2006/compatibility" xmlns:p14="http://schemas.microsoft.com/office/powerpoint/2010/main" type="tx">
+<p:sldLayout xmlns:a="http://schemas.openxmlformats.org/drawingml/2006/main" xmlns:r="http://schemas.openxmlformats.org/officeDocument/2006/relationships" xmlns:p="http://schemas.openxmlformats.org/presentationml/2006/main" type="tx">
   <p:cSld name="Title and Body">
     <p:spTree>
       <p:nvGrpSpPr>
-        <p:cNvPr id="12" name="Shape 12"/>
+        <p:cNvPr id="1" name="Shape 12"/>
         <p:cNvGrpSpPr/>
         <p:nvPr/>
       </p:nvGrpSpPr>
@@ -1344,7 +1505,9 @@
       <p:sp>
         <p:nvSpPr>
           <p:cNvPr id="13" name="Shape 13"/>
-          <p:cNvSpPr txBox="1"/>
+          <p:cNvSpPr txBox="1">
+            <a:spLocks noGrp="1"/>
+          </p:cNvSpPr>
           <p:nvPr>
             <p:ph type="title"/>
           </p:nvPr>
@@ -1359,7 +1522,7 @@
           </a:prstGeom>
         </p:spPr>
         <p:txBody>
-          <a:bodyPr anchorCtr="0" anchor="b" bIns="91425" lIns="91425" rIns="91425" tIns="91425"/>
+          <a:bodyPr lIns="91425" tIns="91425" rIns="91425" bIns="91425" anchor="b" anchorCtr="0"/>
           <a:lstStyle>
             <a:lvl1pPr>
               <a:spcBef>
@@ -1416,15 +1579,19 @@
               <a:defRPr/>
             </a:lvl9pPr>
           </a:lstStyle>
-          <a:p/>
+          <a:p>
+            <a:endParaRPr/>
+          </a:p>
         </p:txBody>
       </p:sp>
       <p:sp>
         <p:nvSpPr>
           <p:cNvPr id="14" name="Shape 14"/>
-          <p:cNvSpPr txBox="1"/>
+          <p:cNvSpPr txBox="1">
+            <a:spLocks noGrp="1"/>
+          </p:cNvSpPr>
           <p:nvPr>
-            <p:ph idx="1" type="body"/>
+            <p:ph type="body" idx="1"/>
           </p:nvPr>
         </p:nvSpPr>
         <p:spPr>
@@ -1437,7 +1604,7 @@
           </a:prstGeom>
         </p:spPr>
         <p:txBody>
-          <a:bodyPr anchorCtr="0" anchor="t" bIns="91425" lIns="91425" rIns="91425" tIns="91425"/>
+          <a:bodyPr lIns="91425" tIns="91425" rIns="91425" bIns="91425" anchor="t" anchorCtr="0"/>
           <a:lstStyle>
             <a:lvl1pPr>
               <a:spcBef>
@@ -1494,15 +1661,19 @@
               <a:defRPr/>
             </a:lvl9pPr>
           </a:lstStyle>
-          <a:p/>
+          <a:p>
+            <a:endParaRPr/>
+          </a:p>
         </p:txBody>
       </p:sp>
       <p:sp>
         <p:nvSpPr>
           <p:cNvPr id="15" name="Shape 15"/>
-          <p:cNvSpPr txBox="1"/>
+          <p:cNvSpPr txBox="1">
+            <a:spLocks noGrp="1"/>
+          </p:cNvSpPr>
           <p:nvPr>
-            <p:ph idx="12" type="sldNum"/>
+            <p:ph type="sldNum" idx="12"/>
           </p:nvPr>
         </p:nvSpPr>
         <p:spPr>
@@ -1515,7 +1686,7 @@
           </a:prstGeom>
         </p:spPr>
         <p:txBody>
-          <a:bodyPr anchorCtr="0" anchor="ctr" bIns="91425" lIns="91425" rIns="91425" tIns="91425">
+          <a:bodyPr lIns="91425" tIns="91425" rIns="91425" bIns="91425" anchor="ctr" anchorCtr="0">
             <a:noAutofit/>
           </a:bodyPr>
           <a:lstStyle>
@@ -1538,6 +1709,7 @@
               <a:rPr lang="en"/>
               <a:t>‹#›</a:t>
             </a:fld>
+            <a:endParaRPr lang="en"/>
           </a:p>
         </p:txBody>
       </p:sp>
@@ -1550,11 +1722,11 @@
 </file>
 
 <file path=ppt/slideLayouts/slideLayout3.xml><?xml version="1.0" encoding="utf-8"?>
-<p:sldLayout xmlns:a="http://schemas.openxmlformats.org/drawingml/2006/main" xmlns:r="http://schemas.openxmlformats.org/officeDocument/2006/relationships" xmlns:mc="http://schemas.openxmlformats.org/markup-compatibility/2006" xmlns:mv="urn:schemas-microsoft-com:mac:vml" xmlns:p="http://schemas.openxmlformats.org/presentationml/2006/main" xmlns:c="http://schemas.openxmlformats.org/drawingml/2006/chart" xmlns:dgm="http://schemas.openxmlformats.org/drawingml/2006/diagram" xmlns:o="urn:schemas-microsoft-com:office:office" xmlns:v="urn:schemas-microsoft-com:vml" xmlns:pvml="urn:schemas-microsoft-com:office:powerpoint" xmlns:com="http://schemas.openxmlformats.org/drawingml/2006/compatibility" xmlns:p14="http://schemas.microsoft.com/office/powerpoint/2010/main" type="twoColTx">
+<p:sldLayout xmlns:a="http://schemas.openxmlformats.org/drawingml/2006/main" xmlns:r="http://schemas.openxmlformats.org/officeDocument/2006/relationships" xmlns:p="http://schemas.openxmlformats.org/presentationml/2006/main" type="twoColTx">
   <p:cSld name="Title and Two Columns">
     <p:spTree>
       <p:nvGrpSpPr>
-        <p:cNvPr id="16" name="Shape 16"/>
+        <p:cNvPr id="1" name="Shape 16"/>
         <p:cNvGrpSpPr/>
         <p:nvPr/>
       </p:nvGrpSpPr>
@@ -1569,7 +1741,9 @@
       <p:sp>
         <p:nvSpPr>
           <p:cNvPr id="17" name="Shape 17"/>
-          <p:cNvSpPr txBox="1"/>
+          <p:cNvSpPr txBox="1">
+            <a:spLocks noGrp="1"/>
+          </p:cNvSpPr>
           <p:nvPr>
             <p:ph type="title"/>
           </p:nvPr>
@@ -1584,7 +1758,7 @@
           </a:prstGeom>
         </p:spPr>
         <p:txBody>
-          <a:bodyPr anchorCtr="0" anchor="b" bIns="91425" lIns="91425" rIns="91425" tIns="91425"/>
+          <a:bodyPr lIns="91425" tIns="91425" rIns="91425" bIns="91425" anchor="b" anchorCtr="0"/>
           <a:lstStyle>
             <a:lvl1pPr>
               <a:spcBef>
@@ -1641,15 +1815,19 @@
               <a:defRPr/>
             </a:lvl9pPr>
           </a:lstStyle>
-          <a:p/>
+          <a:p>
+            <a:endParaRPr/>
+          </a:p>
         </p:txBody>
       </p:sp>
       <p:sp>
         <p:nvSpPr>
           <p:cNvPr id="18" name="Shape 18"/>
-          <p:cNvSpPr txBox="1"/>
+          <p:cNvSpPr txBox="1">
+            <a:spLocks noGrp="1"/>
+          </p:cNvSpPr>
           <p:nvPr>
-            <p:ph idx="1" type="body"/>
+            <p:ph type="body" idx="1"/>
           </p:nvPr>
         </p:nvSpPr>
         <p:spPr>
@@ -1662,7 +1840,7 @@
           </a:prstGeom>
         </p:spPr>
         <p:txBody>
-          <a:bodyPr anchorCtr="0" anchor="t" bIns="91425" lIns="91425" rIns="91425" tIns="91425"/>
+          <a:bodyPr lIns="91425" tIns="91425" rIns="91425" bIns="91425" anchor="t" anchorCtr="0"/>
           <a:lstStyle>
             <a:lvl1pPr>
               <a:spcBef>
@@ -1719,15 +1897,19 @@
               <a:defRPr/>
             </a:lvl9pPr>
           </a:lstStyle>
-          <a:p/>
+          <a:p>
+            <a:endParaRPr/>
+          </a:p>
         </p:txBody>
       </p:sp>
       <p:sp>
         <p:nvSpPr>
           <p:cNvPr id="19" name="Shape 19"/>
-          <p:cNvSpPr txBox="1"/>
+          <p:cNvSpPr txBox="1">
+            <a:spLocks noGrp="1"/>
+          </p:cNvSpPr>
           <p:nvPr>
-            <p:ph idx="2" type="body"/>
+            <p:ph type="body" idx="2"/>
           </p:nvPr>
         </p:nvSpPr>
         <p:spPr>
@@ -1740,7 +1922,7 @@
           </a:prstGeom>
         </p:spPr>
         <p:txBody>
-          <a:bodyPr anchorCtr="0" anchor="t" bIns="91425" lIns="91425" rIns="91425" tIns="91425"/>
+          <a:bodyPr lIns="91425" tIns="91425" rIns="91425" bIns="91425" anchor="t" anchorCtr="0"/>
           <a:lstStyle>
             <a:lvl1pPr>
               <a:spcBef>
@@ -1797,15 +1979,19 @@
               <a:defRPr/>
             </a:lvl9pPr>
           </a:lstStyle>
-          <a:p/>
+          <a:p>
+            <a:endParaRPr/>
+          </a:p>
         </p:txBody>
       </p:sp>
       <p:sp>
         <p:nvSpPr>
           <p:cNvPr id="20" name="Shape 20"/>
-          <p:cNvSpPr txBox="1"/>
+          <p:cNvSpPr txBox="1">
+            <a:spLocks noGrp="1"/>
+          </p:cNvSpPr>
           <p:nvPr>
-            <p:ph idx="12" type="sldNum"/>
+            <p:ph type="sldNum" idx="12"/>
           </p:nvPr>
         </p:nvSpPr>
         <p:spPr>
@@ -1818,7 +2004,7 @@
           </a:prstGeom>
         </p:spPr>
         <p:txBody>
-          <a:bodyPr anchorCtr="0" anchor="ctr" bIns="91425" lIns="91425" rIns="91425" tIns="91425">
+          <a:bodyPr lIns="91425" tIns="91425" rIns="91425" bIns="91425" anchor="ctr" anchorCtr="0">
             <a:noAutofit/>
           </a:bodyPr>
           <a:lstStyle>
@@ -1841,6 +2027,7 @@
               <a:rPr lang="en"/>
               <a:t>‹#›</a:t>
             </a:fld>
+            <a:endParaRPr lang="en"/>
           </a:p>
         </p:txBody>
       </p:sp>
@@ -1853,11 +2040,11 @@
 </file>
 
 <file path=ppt/slideLayouts/slideLayout4.xml><?xml version="1.0" encoding="utf-8"?>
-<p:sldLayout xmlns:a="http://schemas.openxmlformats.org/drawingml/2006/main" xmlns:r="http://schemas.openxmlformats.org/officeDocument/2006/relationships" xmlns:mc="http://schemas.openxmlformats.org/markup-compatibility/2006" xmlns:mv="urn:schemas-microsoft-com:mac:vml" xmlns:p="http://schemas.openxmlformats.org/presentationml/2006/main" xmlns:c="http://schemas.openxmlformats.org/drawingml/2006/chart" xmlns:dgm="http://schemas.openxmlformats.org/drawingml/2006/diagram" xmlns:o="urn:schemas-microsoft-com:office:office" xmlns:v="urn:schemas-microsoft-com:vml" xmlns:pvml="urn:schemas-microsoft-com:office:powerpoint" xmlns:com="http://schemas.openxmlformats.org/drawingml/2006/compatibility" xmlns:p14="http://schemas.microsoft.com/office/powerpoint/2010/main" type="titleOnly">
+<p:sldLayout xmlns:a="http://schemas.openxmlformats.org/drawingml/2006/main" xmlns:r="http://schemas.openxmlformats.org/officeDocument/2006/relationships" xmlns:p="http://schemas.openxmlformats.org/presentationml/2006/main" type="titleOnly">
   <p:cSld name="Title Only">
     <p:spTree>
       <p:nvGrpSpPr>
-        <p:cNvPr id="21" name="Shape 21"/>
+        <p:cNvPr id="1" name="Shape 21"/>
         <p:cNvGrpSpPr/>
         <p:nvPr/>
       </p:nvGrpSpPr>
@@ -1872,7 +2059,9 @@
       <p:sp>
         <p:nvSpPr>
           <p:cNvPr id="22" name="Shape 22"/>
-          <p:cNvSpPr txBox="1"/>
+          <p:cNvSpPr txBox="1">
+            <a:spLocks noGrp="1"/>
+          </p:cNvSpPr>
           <p:nvPr>
             <p:ph type="title"/>
           </p:nvPr>
@@ -1887,7 +2076,7 @@
           </a:prstGeom>
         </p:spPr>
         <p:txBody>
-          <a:bodyPr anchorCtr="0" anchor="b" bIns="91425" lIns="91425" rIns="91425" tIns="91425"/>
+          <a:bodyPr lIns="91425" tIns="91425" rIns="91425" bIns="91425" anchor="b" anchorCtr="0"/>
           <a:lstStyle>
             <a:lvl1pPr>
               <a:spcBef>
@@ -1944,15 +2133,19 @@
               <a:defRPr/>
             </a:lvl9pPr>
           </a:lstStyle>
-          <a:p/>
+          <a:p>
+            <a:endParaRPr/>
+          </a:p>
         </p:txBody>
       </p:sp>
       <p:sp>
         <p:nvSpPr>
           <p:cNvPr id="23" name="Shape 23"/>
-          <p:cNvSpPr txBox="1"/>
+          <p:cNvSpPr txBox="1">
+            <a:spLocks noGrp="1"/>
+          </p:cNvSpPr>
           <p:nvPr>
-            <p:ph idx="12" type="sldNum"/>
+            <p:ph type="sldNum" idx="12"/>
           </p:nvPr>
         </p:nvSpPr>
         <p:spPr>
@@ -1965,7 +2158,7 @@
           </a:prstGeom>
         </p:spPr>
         <p:txBody>
-          <a:bodyPr anchorCtr="0" anchor="ctr" bIns="91425" lIns="91425" rIns="91425" tIns="91425">
+          <a:bodyPr lIns="91425" tIns="91425" rIns="91425" bIns="91425" anchor="ctr" anchorCtr="0">
             <a:noAutofit/>
           </a:bodyPr>
           <a:lstStyle>
@@ -1988,6 +2181,7 @@
               <a:rPr lang="en"/>
               <a:t>‹#›</a:t>
             </a:fld>
+            <a:endParaRPr lang="en"/>
           </a:p>
         </p:txBody>
       </p:sp>
@@ -2000,11 +2194,11 @@
 </file>
 
 <file path=ppt/slideLayouts/slideLayout5.xml><?xml version="1.0" encoding="utf-8"?>
-<p:sldLayout xmlns:a="http://schemas.openxmlformats.org/drawingml/2006/main" xmlns:r="http://schemas.openxmlformats.org/officeDocument/2006/relationships" xmlns:mc="http://schemas.openxmlformats.org/markup-compatibility/2006" xmlns:mv="urn:schemas-microsoft-com:mac:vml" xmlns:p="http://schemas.openxmlformats.org/presentationml/2006/main" xmlns:c="http://schemas.openxmlformats.org/drawingml/2006/chart" xmlns:dgm="http://schemas.openxmlformats.org/drawingml/2006/diagram" xmlns:o="urn:schemas-microsoft-com:office:office" xmlns:v="urn:schemas-microsoft-com:vml" xmlns:pvml="urn:schemas-microsoft-com:office:powerpoint" xmlns:com="http://schemas.openxmlformats.org/drawingml/2006/compatibility" xmlns:p14="http://schemas.microsoft.com/office/powerpoint/2010/main">
+<p:sldLayout xmlns:a="http://schemas.openxmlformats.org/drawingml/2006/main" xmlns:r="http://schemas.openxmlformats.org/officeDocument/2006/relationships" xmlns:p="http://schemas.openxmlformats.org/presentationml/2006/main">
   <p:cSld name="Caption">
     <p:spTree>
       <p:nvGrpSpPr>
-        <p:cNvPr id="24" name="Shape 24"/>
+        <p:cNvPr id="1" name="Shape 24"/>
         <p:cNvGrpSpPr/>
         <p:nvPr/>
       </p:nvGrpSpPr>
@@ -2019,9 +2213,11 @@
       <p:sp>
         <p:nvSpPr>
           <p:cNvPr id="25" name="Shape 25"/>
-          <p:cNvSpPr txBox="1"/>
+          <p:cNvSpPr txBox="1">
+            <a:spLocks noGrp="1"/>
+          </p:cNvSpPr>
           <p:nvPr>
-            <p:ph idx="1" type="body"/>
+            <p:ph type="body" idx="1"/>
           </p:nvPr>
         </p:nvSpPr>
         <p:spPr>
@@ -2034,7 +2230,7 @@
           </a:prstGeom>
         </p:spPr>
         <p:txBody>
-          <a:bodyPr anchorCtr="0" anchor="t" bIns="91425" lIns="91425" rIns="91425" tIns="91425"/>
+          <a:bodyPr lIns="91425" tIns="91425" rIns="91425" bIns="91425" anchor="t" anchorCtr="0"/>
           <a:lstStyle>
             <a:lvl1pPr algn="ctr">
               <a:spcBef>
@@ -2045,15 +2241,19 @@
               <a:defRPr sz="1800"/>
             </a:lvl1pPr>
           </a:lstStyle>
-          <a:p/>
+          <a:p>
+            <a:endParaRPr/>
+          </a:p>
         </p:txBody>
       </p:sp>
       <p:sp>
         <p:nvSpPr>
           <p:cNvPr id="26" name="Shape 26"/>
-          <p:cNvSpPr txBox="1"/>
+          <p:cNvSpPr txBox="1">
+            <a:spLocks noGrp="1"/>
+          </p:cNvSpPr>
           <p:nvPr>
-            <p:ph idx="12" type="sldNum"/>
+            <p:ph type="sldNum" idx="12"/>
           </p:nvPr>
         </p:nvSpPr>
         <p:spPr>
@@ -2066,7 +2266,7 @@
           </a:prstGeom>
         </p:spPr>
         <p:txBody>
-          <a:bodyPr anchorCtr="0" anchor="ctr" bIns="91425" lIns="91425" rIns="91425" tIns="91425">
+          <a:bodyPr lIns="91425" tIns="91425" rIns="91425" bIns="91425" anchor="ctr" anchorCtr="0">
             <a:noAutofit/>
           </a:bodyPr>
           <a:lstStyle>
@@ -2089,6 +2289,7 @@
               <a:rPr lang="en"/>
               <a:t>‹#›</a:t>
             </a:fld>
+            <a:endParaRPr lang="en"/>
           </a:p>
         </p:txBody>
       </p:sp>
@@ -2101,11 +2302,11 @@
 </file>
 
 <file path=ppt/slideLayouts/slideLayout6.xml><?xml version="1.0" encoding="utf-8"?>
-<p:sldLayout xmlns:a="http://schemas.openxmlformats.org/drawingml/2006/main" xmlns:r="http://schemas.openxmlformats.org/officeDocument/2006/relationships" xmlns:mc="http://schemas.openxmlformats.org/markup-compatibility/2006" xmlns:mv="urn:schemas-microsoft-com:mac:vml" xmlns:p="http://schemas.openxmlformats.org/presentationml/2006/main" xmlns:c="http://schemas.openxmlformats.org/drawingml/2006/chart" xmlns:dgm="http://schemas.openxmlformats.org/drawingml/2006/diagram" xmlns:o="urn:schemas-microsoft-com:office:office" xmlns:v="urn:schemas-microsoft-com:vml" xmlns:pvml="urn:schemas-microsoft-com:office:powerpoint" xmlns:com="http://schemas.openxmlformats.org/drawingml/2006/compatibility" xmlns:p14="http://schemas.microsoft.com/office/powerpoint/2010/main" type="blank">
+<p:sldLayout xmlns:a="http://schemas.openxmlformats.org/drawingml/2006/main" xmlns:r="http://schemas.openxmlformats.org/officeDocument/2006/relationships" xmlns:p="http://schemas.openxmlformats.org/presentationml/2006/main" type="blank">
   <p:cSld name="Blank">
     <p:spTree>
       <p:nvGrpSpPr>
-        <p:cNvPr id="27" name="Shape 27"/>
+        <p:cNvPr id="1" name="Shape 27"/>
         <p:cNvGrpSpPr/>
         <p:nvPr/>
       </p:nvGrpSpPr>
@@ -2120,9 +2321,11 @@
       <p:sp>
         <p:nvSpPr>
           <p:cNvPr id="28" name="Shape 28"/>
-          <p:cNvSpPr txBox="1"/>
+          <p:cNvSpPr txBox="1">
+            <a:spLocks noGrp="1"/>
+          </p:cNvSpPr>
           <p:nvPr>
-            <p:ph idx="12" type="sldNum"/>
+            <p:ph type="sldNum" idx="12"/>
           </p:nvPr>
         </p:nvSpPr>
         <p:spPr>
@@ -2135,7 +2338,7 @@
           </a:prstGeom>
         </p:spPr>
         <p:txBody>
-          <a:bodyPr anchorCtr="0" anchor="ctr" bIns="91425" lIns="91425" rIns="91425" tIns="91425">
+          <a:bodyPr lIns="91425" tIns="91425" rIns="91425" bIns="91425" anchor="ctr" anchorCtr="0">
             <a:noAutofit/>
           </a:bodyPr>
           <a:lstStyle>
@@ -2158,6 +2361,7 @@
               <a:rPr lang="en"/>
               <a:t>‹#›</a:t>
             </a:fld>
+            <a:endParaRPr lang="en"/>
           </a:p>
         </p:txBody>
       </p:sp>
@@ -2170,7 +2374,7 @@
 </file>
 
 <file path=ppt/slideMasters/slideMaster1.xml><?xml version="1.0" encoding="utf-8"?>
-<p:sldMaster xmlns:a="http://schemas.openxmlformats.org/drawingml/2006/main" xmlns:r="http://schemas.openxmlformats.org/officeDocument/2006/relationships" xmlns:mc="http://schemas.openxmlformats.org/markup-compatibility/2006" xmlns:mv="urn:schemas-microsoft-com:mac:vml" xmlns:p="http://schemas.openxmlformats.org/presentationml/2006/main" xmlns:c="http://schemas.openxmlformats.org/drawingml/2006/chart" xmlns:dgm="http://schemas.openxmlformats.org/drawingml/2006/diagram" xmlns:o="urn:schemas-microsoft-com:office:office" xmlns:v="urn:schemas-microsoft-com:vml" xmlns:pvml="urn:schemas-microsoft-com:office:powerpoint" xmlns:com="http://schemas.openxmlformats.org/drawingml/2006/compatibility" xmlns:p14="http://schemas.microsoft.com/office/powerpoint/2010/main">
+<p:sldMaster xmlns:a="http://schemas.openxmlformats.org/drawingml/2006/main" xmlns:r="http://schemas.openxmlformats.org/officeDocument/2006/relationships" xmlns:p="http://schemas.openxmlformats.org/presentationml/2006/main">
   <p:cSld>
     <p:bg>
       <p:bgPr>
@@ -2184,15 +2388,16 @@
             </a:gs>
           </a:gsLst>
           <a:path path="circle">
-            <a:fillToRect b="50%" l="50%" r="50%" t="50%"/>
+            <a:fillToRect l="50000" t="50000" r="50000" b="50000"/>
           </a:path>
           <a:tileRect/>
         </a:gradFill>
+        <a:effectLst/>
       </p:bgPr>
     </p:bg>
     <p:spTree>
       <p:nvGrpSpPr>
-        <p:cNvPr id="4" name="Shape 4"/>
+        <p:cNvPr id="1" name="Shape 4"/>
         <p:cNvGrpSpPr/>
         <p:nvPr/>
       </p:nvGrpSpPr>
@@ -2207,7 +2412,9 @@
       <p:sp>
         <p:nvSpPr>
           <p:cNvPr id="5" name="Shape 5"/>
-          <p:cNvSpPr txBox="1"/>
+          <p:cNvSpPr txBox="1">
+            <a:spLocks noGrp="1"/>
+          </p:cNvSpPr>
           <p:nvPr>
             <p:ph type="title"/>
           </p:nvPr>
@@ -2226,7 +2433,7 @@
           </a:ln>
         </p:spPr>
         <p:txBody>
-          <a:bodyPr anchorCtr="0" anchor="b" bIns="91425" lIns="91425" rIns="91425" tIns="91425"/>
+          <a:bodyPr lIns="91425" tIns="91425" rIns="91425" bIns="91425" anchor="b" anchorCtr="0"/>
           <a:lstStyle>
             <a:lvl1pPr>
               <a:spcBef>
@@ -2237,7 +2444,7 @@
               </a:buClr>
               <a:buSzPct val="100000"/>
               <a:buNone/>
-              <a:defRPr b="1" sz="3600">
+              <a:defRPr sz="3600" b="1">
                 <a:solidFill>
                   <a:schemeClr val="lt1"/>
                 </a:solidFill>
@@ -2252,7 +2459,7 @@
               </a:buClr>
               <a:buSzPct val="100000"/>
               <a:buNone/>
-              <a:defRPr b="1" sz="3600">
+              <a:defRPr sz="3600" b="1">
                 <a:solidFill>
                   <a:schemeClr val="lt1"/>
                 </a:solidFill>
@@ -2267,7 +2474,7 @@
               </a:buClr>
               <a:buSzPct val="100000"/>
               <a:buNone/>
-              <a:defRPr b="1" sz="3600">
+              <a:defRPr sz="3600" b="1">
                 <a:solidFill>
                   <a:schemeClr val="lt1"/>
                 </a:solidFill>
@@ -2282,7 +2489,7 @@
               </a:buClr>
               <a:buSzPct val="100000"/>
               <a:buNone/>
-              <a:defRPr b="1" sz="3600">
+              <a:defRPr sz="3600" b="1">
                 <a:solidFill>
                   <a:schemeClr val="lt1"/>
                 </a:solidFill>
@@ -2297,7 +2504,7 @@
               </a:buClr>
               <a:buSzPct val="100000"/>
               <a:buNone/>
-              <a:defRPr b="1" sz="3600">
+              <a:defRPr sz="3600" b="1">
                 <a:solidFill>
                   <a:schemeClr val="lt1"/>
                 </a:solidFill>
@@ -2312,7 +2519,7 @@
               </a:buClr>
               <a:buSzPct val="100000"/>
               <a:buNone/>
-              <a:defRPr b="1" sz="3600">
+              <a:defRPr sz="3600" b="1">
                 <a:solidFill>
                   <a:schemeClr val="lt1"/>
                 </a:solidFill>
@@ -2327,7 +2534,7 @@
               </a:buClr>
               <a:buSzPct val="100000"/>
               <a:buNone/>
-              <a:defRPr b="1" sz="3600">
+              <a:defRPr sz="3600" b="1">
                 <a:solidFill>
                   <a:schemeClr val="lt1"/>
                 </a:solidFill>
@@ -2342,7 +2549,7 @@
               </a:buClr>
               <a:buSzPct val="100000"/>
               <a:buNone/>
-              <a:defRPr b="1" sz="3600">
+              <a:defRPr sz="3600" b="1">
                 <a:solidFill>
                   <a:schemeClr val="lt1"/>
                 </a:solidFill>
@@ -2357,22 +2564,26 @@
               </a:buClr>
               <a:buSzPct val="100000"/>
               <a:buNone/>
-              <a:defRPr b="1" sz="3600">
+              <a:defRPr sz="3600" b="1">
                 <a:solidFill>
                   <a:schemeClr val="lt1"/>
                 </a:solidFill>
               </a:defRPr>
             </a:lvl9pPr>
           </a:lstStyle>
-          <a:p/>
+          <a:p>
+            <a:endParaRPr/>
+          </a:p>
         </p:txBody>
       </p:sp>
       <p:sp>
         <p:nvSpPr>
           <p:cNvPr id="6" name="Shape 6"/>
-          <p:cNvSpPr txBox="1"/>
+          <p:cNvSpPr txBox="1">
+            <a:spLocks noGrp="1"/>
+          </p:cNvSpPr>
           <p:nvPr>
-            <p:ph idx="1" type="body"/>
+            <p:ph type="body" idx="1"/>
           </p:nvPr>
         </p:nvSpPr>
         <p:spPr>
@@ -2389,7 +2600,7 @@
           </a:ln>
         </p:spPr>
         <p:txBody>
-          <a:bodyPr anchorCtr="0" anchor="t" bIns="91425" lIns="91425" rIns="91425" tIns="91425"/>
+          <a:bodyPr lIns="91425" tIns="91425" rIns="91425" bIns="91425" anchor="t" anchorCtr="0"/>
           <a:lstStyle>
             <a:lvl1pPr>
               <a:spcBef>
@@ -2518,15 +2729,19 @@
               </a:defRPr>
             </a:lvl9pPr>
           </a:lstStyle>
-          <a:p/>
+          <a:p>
+            <a:endParaRPr/>
+          </a:p>
         </p:txBody>
       </p:sp>
       <p:sp>
         <p:nvSpPr>
           <p:cNvPr id="7" name="Shape 7"/>
-          <p:cNvSpPr txBox="1"/>
+          <p:cNvSpPr txBox="1">
+            <a:spLocks noGrp="1"/>
+          </p:cNvSpPr>
           <p:nvPr>
-            <p:ph idx="12" type="sldNum"/>
+            <p:ph type="sldNum" idx="12"/>
           </p:nvPr>
         </p:nvSpPr>
         <p:spPr>
@@ -2543,7 +2758,7 @@
           </a:ln>
         </p:spPr>
         <p:txBody>
-          <a:bodyPr anchorCtr="0" anchor="ctr" bIns="91425" lIns="91425" rIns="91425" tIns="91425">
+          <a:bodyPr lIns="91425" tIns="91425" rIns="91425" bIns="91425" anchor="ctr" anchorCtr="0">
             <a:noAutofit/>
           </a:bodyPr>
           <a:lstStyle>
@@ -2570,12 +2785,13 @@
               <a:rPr lang="en"/>
               <a:t>‹#›</a:t>
             </a:fld>
+            <a:endParaRPr lang="en"/>
           </a:p>
         </p:txBody>
       </p:sp>
     </p:spTree>
   </p:cSld>
-  <p:clrMap accent1="accent1" accent2="accent2" accent3="accent3" accent4="accent4" accent5="accent5" accent6="accent6" bg1="lt1" bg2="dk2" tx1="dk1" tx2="lt2" folHlink="folHlink" hlink="hlink"/>
+  <p:clrMap bg1="lt1" tx1="dk1" bg2="dk2" tx2="lt2" accent1="accent1" accent2="accent2" accent3="accent3" accent4="accent4" accent5="accent5" accent6="accent6" hlink="hlink" folHlink="folHlink"/>
   <p:sldLayoutIdLst>
     <p:sldLayoutId id="2147483648" r:id="rId1"/>
     <p:sldLayoutId id="2147483649" r:id="rId2"/>
@@ -2584,10 +2800,10 @@
     <p:sldLayoutId id="2147483652" r:id="rId5"/>
     <p:sldLayoutId id="2147483653" r:id="rId6"/>
   </p:sldLayoutIdLst>
-  <p:hf dt="0" ftr="0" hdr="0" sldNum="0"/>
+  <p:hf sldNum="0" hdr="0" ftr="0" dt="0"/>
   <p:txStyles>
     <p:titleStyle>
-      <a:defPPr marR="0" rtl="0" algn="l">
+      <a:defPPr marR="0" algn="l" rtl="0">
         <a:lnSpc>
           <a:spcPct val="100000"/>
         </a:lnSpc>
@@ -2598,7 +2814,7 @@
           <a:spcPts val="0"/>
         </a:spcAft>
       </a:defPPr>
-      <a:lvl1pPr marR="0" rtl="0" algn="l">
+      <a:lvl1pPr marR="0" algn="l" rtl="0">
         <a:lnSpc>
           <a:spcPct val="100000"/>
         </a:lnSpc>
@@ -2609,7 +2825,7 @@
           <a:spcPts val="0"/>
         </a:spcAft>
         <a:buNone/>
-        <a:defRPr b="0" baseline="0" i="0" sz="1400" u="none" cap="none" strike="noStrike">
+        <a:defRPr sz="1400" b="0" i="0" u="none" strike="noStrike" cap="none" baseline="0">
           <a:solidFill>
             <a:srgbClr val="000000"/>
           </a:solidFill>
@@ -2620,7 +2836,7 @@
           <a:rtl val="0"/>
         </a:defRPr>
       </a:lvl1pPr>
-      <a:lvl2pPr marR="0" rtl="0" algn="l">
+      <a:lvl2pPr marR="0" algn="l" rtl="0">
         <a:lnSpc>
           <a:spcPct val="100000"/>
         </a:lnSpc>
@@ -2631,7 +2847,7 @@
           <a:spcPts val="0"/>
         </a:spcAft>
         <a:buNone/>
-        <a:defRPr b="0" baseline="0" i="0" sz="1400" u="none" cap="none" strike="noStrike">
+        <a:defRPr sz="1400" b="0" i="0" u="none" strike="noStrike" cap="none" baseline="0">
           <a:solidFill>
             <a:srgbClr val="000000"/>
           </a:solidFill>
@@ -2644,7 +2860,7 @@
       </a:lvl2pPr>
     </p:titleStyle>
     <p:bodyStyle>
-      <a:defPPr marR="0" rtl="0" algn="l">
+      <a:defPPr marR="0" algn="l" rtl="0">
         <a:lnSpc>
           <a:spcPct val="100000"/>
         </a:lnSpc>
@@ -2655,7 +2871,7 @@
           <a:spcPts val="0"/>
         </a:spcAft>
       </a:defPPr>
-      <a:lvl1pPr marR="0" rtl="0" algn="l">
+      <a:lvl1pPr marR="0" algn="l" rtl="0">
         <a:lnSpc>
           <a:spcPct val="100000"/>
         </a:lnSpc>
@@ -2666,7 +2882,7 @@
           <a:spcPts val="0"/>
         </a:spcAft>
         <a:buNone/>
-        <a:defRPr b="0" baseline="0" i="0" sz="1400" u="none" cap="none" strike="noStrike">
+        <a:defRPr sz="1400" b="0" i="0" u="none" strike="noStrike" cap="none" baseline="0">
           <a:solidFill>
             <a:srgbClr val="000000"/>
           </a:solidFill>
@@ -2677,7 +2893,7 @@
           <a:rtl val="0"/>
         </a:defRPr>
       </a:lvl1pPr>
-      <a:lvl2pPr marR="0" rtl="0" algn="l">
+      <a:lvl2pPr marR="0" algn="l" rtl="0">
         <a:lnSpc>
           <a:spcPct val="100000"/>
         </a:lnSpc>
@@ -2688,7 +2904,7 @@
           <a:spcPts val="0"/>
         </a:spcAft>
         <a:buNone/>
-        <a:defRPr b="0" baseline="0" i="0" sz="1400" u="none" cap="none" strike="noStrike">
+        <a:defRPr sz="1400" b="0" i="0" u="none" strike="noStrike" cap="none" baseline="0">
           <a:solidFill>
             <a:srgbClr val="000000"/>
           </a:solidFill>
@@ -2699,7 +2915,7 @@
           <a:rtl val="0"/>
         </a:defRPr>
       </a:lvl2pPr>
-      <a:lvl3pPr marR="0" rtl="0" algn="l">
+      <a:lvl3pPr marR="0" algn="l" rtl="0">
         <a:lnSpc>
           <a:spcPct val="100000"/>
         </a:lnSpc>
@@ -2710,7 +2926,7 @@
           <a:spcPts val="0"/>
         </a:spcAft>
         <a:buNone/>
-        <a:defRPr b="0" baseline="0" i="0" sz="1400" u="none" cap="none" strike="noStrike">
+        <a:defRPr sz="1400" b="0" i="0" u="none" strike="noStrike" cap="none" baseline="0">
           <a:solidFill>
             <a:srgbClr val="000000"/>
           </a:solidFill>
@@ -2721,7 +2937,7 @@
           <a:rtl val="0"/>
         </a:defRPr>
       </a:lvl3pPr>
-      <a:lvl4pPr marR="0" rtl="0" algn="l">
+      <a:lvl4pPr marR="0" algn="l" rtl="0">
         <a:lnSpc>
           <a:spcPct val="100000"/>
         </a:lnSpc>
@@ -2732,7 +2948,7 @@
           <a:spcPts val="0"/>
         </a:spcAft>
         <a:buNone/>
-        <a:defRPr b="0" baseline="0" i="0" sz="1400" u="none" cap="none" strike="noStrike">
+        <a:defRPr sz="1400" b="0" i="0" u="none" strike="noStrike" cap="none" baseline="0">
           <a:solidFill>
             <a:srgbClr val="000000"/>
           </a:solidFill>
@@ -2743,7 +2959,7 @@
           <a:rtl val="0"/>
         </a:defRPr>
       </a:lvl4pPr>
-      <a:lvl5pPr marR="0" rtl="0" algn="l">
+      <a:lvl5pPr marR="0" algn="l" rtl="0">
         <a:lnSpc>
           <a:spcPct val="100000"/>
         </a:lnSpc>
@@ -2754,7 +2970,7 @@
           <a:spcPts val="0"/>
         </a:spcAft>
         <a:buNone/>
-        <a:defRPr b="0" baseline="0" i="0" sz="1400" u="none" cap="none" strike="noStrike">
+        <a:defRPr sz="1400" b="0" i="0" u="none" strike="noStrike" cap="none" baseline="0">
           <a:solidFill>
             <a:srgbClr val="000000"/>
           </a:solidFill>
@@ -2765,7 +2981,7 @@
           <a:rtl val="0"/>
         </a:defRPr>
       </a:lvl5pPr>
-      <a:lvl6pPr marR="0" rtl="0" algn="l">
+      <a:lvl6pPr marR="0" algn="l" rtl="0">
         <a:lnSpc>
           <a:spcPct val="100000"/>
         </a:lnSpc>
@@ -2776,7 +2992,7 @@
           <a:spcPts val="0"/>
         </a:spcAft>
         <a:buNone/>
-        <a:defRPr b="0" baseline="0" i="0" sz="1400" u="none" cap="none" strike="noStrike">
+        <a:defRPr sz="1400" b="0" i="0" u="none" strike="noStrike" cap="none" baseline="0">
           <a:solidFill>
             <a:srgbClr val="000000"/>
           </a:solidFill>
@@ -2787,7 +3003,7 @@
           <a:rtl val="0"/>
         </a:defRPr>
       </a:lvl6pPr>
-      <a:lvl7pPr marR="0" rtl="0" algn="l">
+      <a:lvl7pPr marR="0" algn="l" rtl="0">
         <a:lnSpc>
           <a:spcPct val="100000"/>
         </a:lnSpc>
@@ -2798,7 +3014,7 @@
           <a:spcPts val="0"/>
         </a:spcAft>
         <a:buNone/>
-        <a:defRPr b="0" baseline="0" i="0" sz="1400" u="none" cap="none" strike="noStrike">
+        <a:defRPr sz="1400" b="0" i="0" u="none" strike="noStrike" cap="none" baseline="0">
           <a:solidFill>
             <a:srgbClr val="000000"/>
           </a:solidFill>
@@ -2809,7 +3025,7 @@
           <a:rtl val="0"/>
         </a:defRPr>
       </a:lvl7pPr>
-      <a:lvl8pPr marR="0" rtl="0" algn="l">
+      <a:lvl8pPr marR="0" algn="l" rtl="0">
         <a:lnSpc>
           <a:spcPct val="100000"/>
         </a:lnSpc>
@@ -2820,7 +3036,7 @@
           <a:spcPts val="0"/>
         </a:spcAft>
         <a:buNone/>
-        <a:defRPr b="0" baseline="0" i="0" sz="1400" u="none" cap="none" strike="noStrike">
+        <a:defRPr sz="1400" b="0" i="0" u="none" strike="noStrike" cap="none" baseline="0">
           <a:solidFill>
             <a:srgbClr val="000000"/>
           </a:solidFill>
@@ -2831,7 +3047,7 @@
           <a:rtl val="0"/>
         </a:defRPr>
       </a:lvl8pPr>
-      <a:lvl9pPr marR="0" rtl="0" algn="l">
+      <a:lvl9pPr marR="0" algn="l" rtl="0">
         <a:lnSpc>
           <a:spcPct val="100000"/>
         </a:lnSpc>
@@ -2842,7 +3058,7 @@
           <a:spcPts val="0"/>
         </a:spcAft>
         <a:buNone/>
-        <a:defRPr b="0" baseline="0" i="0" sz="1400" u="none" cap="none" strike="noStrike">
+        <a:defRPr sz="1400" b="0" i="0" u="none" strike="noStrike" cap="none" baseline="0">
           <a:solidFill>
             <a:srgbClr val="000000"/>
           </a:solidFill>
@@ -2855,7 +3071,7 @@
       </a:lvl9pPr>
     </p:bodyStyle>
     <p:otherStyle>
-      <a:defPPr marR="0" rtl="0" algn="l">
+      <a:defPPr marR="0" algn="l" rtl="0">
         <a:lnSpc>
           <a:spcPct val="100000"/>
         </a:lnSpc>
@@ -2866,7 +3082,7 @@
           <a:spcPts val="0"/>
         </a:spcAft>
       </a:defPPr>
-      <a:lvl1pPr marR="0" rtl="0" algn="l">
+      <a:lvl1pPr marR="0" algn="l" rtl="0">
         <a:lnSpc>
           <a:spcPct val="100000"/>
         </a:lnSpc>
@@ -2877,7 +3093,7 @@
           <a:spcPts val="0"/>
         </a:spcAft>
         <a:buNone/>
-        <a:defRPr b="0" baseline="0" i="0" sz="1400" u="none" cap="none" strike="noStrike">
+        <a:defRPr sz="1400" b="0" i="0" u="none" strike="noStrike" cap="none" baseline="0">
           <a:solidFill>
             <a:srgbClr val="000000"/>
           </a:solidFill>
@@ -2888,7 +3104,7 @@
           <a:rtl val="0"/>
         </a:defRPr>
       </a:lvl1pPr>
-      <a:lvl2pPr marR="0" rtl="0" algn="l">
+      <a:lvl2pPr marR="0" algn="l" rtl="0">
         <a:lnSpc>
           <a:spcPct val="100000"/>
         </a:lnSpc>
@@ -2899,7 +3115,7 @@
           <a:spcPts val="0"/>
         </a:spcAft>
         <a:buNone/>
-        <a:defRPr b="0" baseline="0" i="0" sz="1400" u="none" cap="none" strike="noStrike">
+        <a:defRPr sz="1400" b="0" i="0" u="none" strike="noStrike" cap="none" baseline="0">
           <a:solidFill>
             <a:srgbClr val="000000"/>
           </a:solidFill>
@@ -2910,7 +3126,7 @@
           <a:rtl val="0"/>
         </a:defRPr>
       </a:lvl2pPr>
-      <a:lvl3pPr marR="0" rtl="0" algn="l">
+      <a:lvl3pPr marR="0" algn="l" rtl="0">
         <a:lnSpc>
           <a:spcPct val="100000"/>
         </a:lnSpc>
@@ -2921,7 +3137,7 @@
           <a:spcPts val="0"/>
         </a:spcAft>
         <a:buNone/>
-        <a:defRPr b="0" baseline="0" i="0" sz="1400" u="none" cap="none" strike="noStrike">
+        <a:defRPr sz="1400" b="0" i="0" u="none" strike="noStrike" cap="none" baseline="0">
           <a:solidFill>
             <a:srgbClr val="000000"/>
           </a:solidFill>
@@ -2932,7 +3148,7 @@
           <a:rtl val="0"/>
         </a:defRPr>
       </a:lvl3pPr>
-      <a:lvl4pPr marR="0" rtl="0" algn="l">
+      <a:lvl4pPr marR="0" algn="l" rtl="0">
         <a:lnSpc>
           <a:spcPct val="100000"/>
         </a:lnSpc>
@@ -2943,7 +3159,7 @@
           <a:spcPts val="0"/>
         </a:spcAft>
         <a:buNone/>
-        <a:defRPr b="0" baseline="0" i="0" sz="1400" u="none" cap="none" strike="noStrike">
+        <a:defRPr sz="1400" b="0" i="0" u="none" strike="noStrike" cap="none" baseline="0">
           <a:solidFill>
             <a:srgbClr val="000000"/>
           </a:solidFill>
@@ -2954,7 +3170,7 @@
           <a:rtl val="0"/>
         </a:defRPr>
       </a:lvl4pPr>
-      <a:lvl5pPr marR="0" rtl="0" algn="l">
+      <a:lvl5pPr marR="0" algn="l" rtl="0">
         <a:lnSpc>
           <a:spcPct val="100000"/>
         </a:lnSpc>
@@ -2965,7 +3181,7 @@
           <a:spcPts val="0"/>
         </a:spcAft>
         <a:buNone/>
-        <a:defRPr b="0" baseline="0" i="0" sz="1400" u="none" cap="none" strike="noStrike">
+        <a:defRPr sz="1400" b="0" i="0" u="none" strike="noStrike" cap="none" baseline="0">
           <a:solidFill>
             <a:srgbClr val="000000"/>
           </a:solidFill>
@@ -2976,7 +3192,7 @@
           <a:rtl val="0"/>
         </a:defRPr>
       </a:lvl5pPr>
-      <a:lvl6pPr marR="0" rtl="0" algn="l">
+      <a:lvl6pPr marR="0" algn="l" rtl="0">
         <a:lnSpc>
           <a:spcPct val="100000"/>
         </a:lnSpc>
@@ -2987,7 +3203,7 @@
           <a:spcPts val="0"/>
         </a:spcAft>
         <a:buNone/>
-        <a:defRPr b="0" baseline="0" i="0" sz="1400" u="none" cap="none" strike="noStrike">
+        <a:defRPr sz="1400" b="0" i="0" u="none" strike="noStrike" cap="none" baseline="0">
           <a:solidFill>
             <a:srgbClr val="000000"/>
           </a:solidFill>
@@ -2998,7 +3214,7 @@
           <a:rtl val="0"/>
         </a:defRPr>
       </a:lvl6pPr>
-      <a:lvl7pPr marR="0" rtl="0" algn="l">
+      <a:lvl7pPr marR="0" algn="l" rtl="0">
         <a:lnSpc>
           <a:spcPct val="100000"/>
         </a:lnSpc>
@@ -3009,7 +3225,7 @@
           <a:spcPts val="0"/>
         </a:spcAft>
         <a:buNone/>
-        <a:defRPr b="0" baseline="0" i="0" sz="1400" u="none" cap="none" strike="noStrike">
+        <a:defRPr sz="1400" b="0" i="0" u="none" strike="noStrike" cap="none" baseline="0">
           <a:solidFill>
             <a:srgbClr val="000000"/>
           </a:solidFill>
@@ -3020,7 +3236,7 @@
           <a:rtl val="0"/>
         </a:defRPr>
       </a:lvl7pPr>
-      <a:lvl8pPr marR="0" rtl="0" algn="l">
+      <a:lvl8pPr marR="0" algn="l" rtl="0">
         <a:lnSpc>
           <a:spcPct val="100000"/>
         </a:lnSpc>
@@ -3031,7 +3247,7 @@
           <a:spcPts val="0"/>
         </a:spcAft>
         <a:buNone/>
-        <a:defRPr b="0" baseline="0" i="0" sz="1400" u="none" cap="none" strike="noStrike">
+        <a:defRPr sz="1400" b="0" i="0" u="none" strike="noStrike" cap="none" baseline="0">
           <a:solidFill>
             <a:srgbClr val="000000"/>
           </a:solidFill>
@@ -3042,7 +3258,7 @@
           <a:rtl val="0"/>
         </a:defRPr>
       </a:lvl8pPr>
-      <a:lvl9pPr marR="0" rtl="0" algn="l">
+      <a:lvl9pPr marR="0" algn="l" rtl="0">
         <a:lnSpc>
           <a:spcPct val="100000"/>
         </a:lnSpc>
@@ -3053,7 +3269,7 @@
           <a:spcPts val="0"/>
         </a:spcAft>
         <a:buNone/>
-        <a:defRPr b="0" baseline="0" i="0" sz="1400" u="none" cap="none" strike="noStrike">
+        <a:defRPr sz="1400" b="0" i="0" u="none" strike="noStrike" cap="none" baseline="0">
           <a:solidFill>
             <a:srgbClr val="000000"/>
           </a:solidFill>
@@ -3070,11 +3286,11 @@
 </file>
 
 <file path=ppt/slides/slide1.xml><?xml version="1.0" encoding="utf-8"?>
-<p:sld xmlns:a="http://schemas.openxmlformats.org/drawingml/2006/main" xmlns:r="http://schemas.openxmlformats.org/officeDocument/2006/relationships" xmlns:mc="http://schemas.openxmlformats.org/markup-compatibility/2006" xmlns:mv="urn:schemas-microsoft-com:mac:vml" xmlns:p="http://schemas.openxmlformats.org/presentationml/2006/main" xmlns:c="http://schemas.openxmlformats.org/drawingml/2006/chart" xmlns:dgm="http://schemas.openxmlformats.org/drawingml/2006/diagram" xmlns:o="urn:schemas-microsoft-com:office:office" xmlns:v="urn:schemas-microsoft-com:vml" xmlns:pvml="urn:schemas-microsoft-com:office:powerpoint" xmlns:com="http://schemas.openxmlformats.org/drawingml/2006/compatibility" xmlns:p14="http://schemas.microsoft.com/office/powerpoint/2010/main">
+<p:sld xmlns:a="http://schemas.openxmlformats.org/drawingml/2006/main" xmlns:r="http://schemas.openxmlformats.org/officeDocument/2006/relationships" xmlns:p="http://schemas.openxmlformats.org/presentationml/2006/main">
   <p:cSld>
     <p:spTree>
       <p:nvGrpSpPr>
-        <p:cNvPr id="29" name="Shape 29"/>
+        <p:cNvPr id="1" name="Shape 29"/>
         <p:cNvGrpSpPr/>
         <p:nvPr/>
       </p:nvGrpSpPr>
@@ -3089,7 +3305,9 @@
       <p:sp>
         <p:nvSpPr>
           <p:cNvPr id="30" name="Shape 30"/>
-          <p:cNvSpPr txBox="1"/>
+          <p:cNvSpPr txBox="1">
+            <a:spLocks noGrp="1"/>
+          </p:cNvSpPr>
           <p:nvPr>
             <p:ph type="ctrTitle"/>
           </p:nvPr>
@@ -3104,7 +3322,7 @@
           </a:prstGeom>
         </p:spPr>
         <p:txBody>
-          <a:bodyPr anchorCtr="0" anchor="b" bIns="91425" lIns="91425" rIns="91425" tIns="91425">
+          <a:bodyPr lIns="91425" tIns="91425" rIns="91425" bIns="91425" anchor="b" anchorCtr="0">
             <a:noAutofit/>
           </a:bodyPr>
           <a:lstStyle/>
@@ -3125,9 +3343,11 @@
       <p:sp>
         <p:nvSpPr>
           <p:cNvPr id="31" name="Shape 31"/>
-          <p:cNvSpPr txBox="1"/>
+          <p:cNvSpPr txBox="1">
+            <a:spLocks noGrp="1"/>
+          </p:cNvSpPr>
           <p:nvPr>
-            <p:ph idx="1" type="subTitle"/>
+            <p:ph type="subTitle" idx="1"/>
           </p:nvPr>
         </p:nvSpPr>
         <p:spPr>
@@ -3140,7 +3360,7 @@
           </a:prstGeom>
         </p:spPr>
         <p:txBody>
-          <a:bodyPr anchorCtr="0" anchor="t" bIns="91425" lIns="91425" rIns="91425" tIns="91425">
+          <a:bodyPr lIns="91425" tIns="91425" rIns="91425" bIns="91425" anchor="t" anchorCtr="0">
             <a:noAutofit/>
           </a:bodyPr>
           <a:lstStyle/>
@@ -3163,18 +3383,18 @@
   <p:clrMapOvr>
     <a:masterClrMapping/>
   </p:clrMapOvr>
-  <p:transition spd="slow">
+  <p:transition xmlns:p14="http://schemas.microsoft.com/office/powerpoint/2010/main" spd="slow">
     <p:cut/>
   </p:transition>
 </p:sld>
 </file>
 
 <file path=ppt/slides/slide2.xml><?xml version="1.0" encoding="utf-8"?>
-<p:sld xmlns:a="http://schemas.openxmlformats.org/drawingml/2006/main" xmlns:r="http://schemas.openxmlformats.org/officeDocument/2006/relationships" xmlns:mc="http://schemas.openxmlformats.org/markup-compatibility/2006" xmlns:mv="urn:schemas-microsoft-com:mac:vml" xmlns:p="http://schemas.openxmlformats.org/presentationml/2006/main" xmlns:c="http://schemas.openxmlformats.org/drawingml/2006/chart" xmlns:dgm="http://schemas.openxmlformats.org/drawingml/2006/diagram" xmlns:o="urn:schemas-microsoft-com:office:office" xmlns:v="urn:schemas-microsoft-com:vml" xmlns:pvml="urn:schemas-microsoft-com:office:powerpoint" xmlns:com="http://schemas.openxmlformats.org/drawingml/2006/compatibility" xmlns:p14="http://schemas.microsoft.com/office/powerpoint/2010/main">
+<p:sld xmlns:a="http://schemas.openxmlformats.org/drawingml/2006/main" xmlns:r="http://schemas.openxmlformats.org/officeDocument/2006/relationships" xmlns:p="http://schemas.openxmlformats.org/presentationml/2006/main">
   <p:cSld>
     <p:spTree>
       <p:nvGrpSpPr>
-        <p:cNvPr id="35" name="Shape 35"/>
+        <p:cNvPr id="1" name="Shape 35"/>
         <p:cNvGrpSpPr/>
         <p:nvPr/>
       </p:nvGrpSpPr>
@@ -3189,7 +3409,9 @@
       <p:sp>
         <p:nvSpPr>
           <p:cNvPr id="36" name="Shape 36"/>
-          <p:cNvSpPr txBox="1"/>
+          <p:cNvSpPr txBox="1">
+            <a:spLocks noGrp="1"/>
+          </p:cNvSpPr>
           <p:nvPr>
             <p:ph type="title"/>
           </p:nvPr>
@@ -3204,7 +3426,7 @@
           </a:prstGeom>
         </p:spPr>
         <p:txBody>
-          <a:bodyPr anchorCtr="0" anchor="b" bIns="91425" lIns="91425" rIns="91425" tIns="91425">
+          <a:bodyPr lIns="91425" tIns="91425" rIns="91425" bIns="91425" anchor="b" anchorCtr="0">
             <a:noAutofit/>
           </a:bodyPr>
           <a:lstStyle/>
@@ -3225,9 +3447,11 @@
       <p:sp>
         <p:nvSpPr>
           <p:cNvPr id="37" name="Shape 37"/>
-          <p:cNvSpPr txBox="1"/>
+          <p:cNvSpPr txBox="1">
+            <a:spLocks noGrp="1"/>
+          </p:cNvSpPr>
           <p:nvPr>
-            <p:ph idx="1" type="body"/>
+            <p:ph type="body" idx="1"/>
           </p:nvPr>
         </p:nvSpPr>
         <p:spPr>
@@ -3240,12 +3464,12 @@
           </a:prstGeom>
         </p:spPr>
         <p:txBody>
-          <a:bodyPr anchorCtr="0" anchor="t" bIns="91425" lIns="91425" rIns="91425" tIns="91425">
+          <a:bodyPr lIns="91425" tIns="91425" rIns="91425" bIns="91425" anchor="t" anchorCtr="0">
             <a:noAutofit/>
           </a:bodyPr>
           <a:lstStyle/>
           <a:p>
-            <a:pPr indent="-419100" lvl="0" marL="457200" rtl="0">
+            <a:pPr marL="457200" lvl="0" indent="-419100" rtl="0">
               <a:spcBef>
                 <a:spcPts val="0"/>
               </a:spcBef>
@@ -3262,7 +3486,7 @@
             </a:r>
           </a:p>
           <a:p>
-            <a:pPr indent="-419100" lvl="0" marL="457200" rtl="0">
+            <a:pPr marL="457200" lvl="0" indent="-419100" rtl="0">
               <a:spcBef>
                 <a:spcPts val="0"/>
               </a:spcBef>
@@ -3279,7 +3503,7 @@
             </a:r>
           </a:p>
           <a:p>
-            <a:pPr indent="-419100" lvl="0" marL="457200" rtl="0">
+            <a:pPr marL="457200" lvl="0" indent="-419100" rtl="0">
               <a:spcBef>
                 <a:spcPts val="0"/>
               </a:spcBef>
@@ -3302,18 +3526,18 @@
   <p:clrMapOvr>
     <a:masterClrMapping/>
   </p:clrMapOvr>
-  <p:transition spd="slow">
+  <p:transition xmlns:p14="http://schemas.microsoft.com/office/powerpoint/2010/main" spd="slow">
     <p:cut/>
   </p:transition>
 </p:sld>
 </file>
 
 <file path=ppt/slides/slide3.xml><?xml version="1.0" encoding="utf-8"?>
-<p:sld xmlns:a="http://schemas.openxmlformats.org/drawingml/2006/main" xmlns:r="http://schemas.openxmlformats.org/officeDocument/2006/relationships" xmlns:mc="http://schemas.openxmlformats.org/markup-compatibility/2006" xmlns:mv="urn:schemas-microsoft-com:mac:vml" xmlns:p="http://schemas.openxmlformats.org/presentationml/2006/main" xmlns:c="http://schemas.openxmlformats.org/drawingml/2006/chart" xmlns:dgm="http://schemas.openxmlformats.org/drawingml/2006/diagram" xmlns:o="urn:schemas-microsoft-com:office:office" xmlns:v="urn:schemas-microsoft-com:vml" xmlns:pvml="urn:schemas-microsoft-com:office:powerpoint" xmlns:com="http://schemas.openxmlformats.org/drawingml/2006/compatibility" xmlns:p14="http://schemas.microsoft.com/office/powerpoint/2010/main">
+<p:sld xmlns:a="http://schemas.openxmlformats.org/drawingml/2006/main" xmlns:r="http://schemas.openxmlformats.org/officeDocument/2006/relationships" xmlns:p="http://schemas.openxmlformats.org/presentationml/2006/main">
   <p:cSld>
     <p:spTree>
       <p:nvGrpSpPr>
-        <p:cNvPr id="41" name="Shape 41"/>
+        <p:cNvPr id="1" name="Shape 41"/>
         <p:cNvGrpSpPr/>
         <p:nvPr/>
       </p:nvGrpSpPr>
@@ -3328,7 +3552,9 @@
       <p:sp>
         <p:nvSpPr>
           <p:cNvPr id="42" name="Shape 42"/>
-          <p:cNvSpPr txBox="1"/>
+          <p:cNvSpPr txBox="1">
+            <a:spLocks noGrp="1"/>
+          </p:cNvSpPr>
           <p:nvPr>
             <p:ph type="title"/>
           </p:nvPr>
@@ -3343,7 +3569,7 @@
           </a:prstGeom>
         </p:spPr>
         <p:txBody>
-          <a:bodyPr anchorCtr="0" anchor="b" bIns="91425" lIns="91425" rIns="91425" tIns="91425">
+          <a:bodyPr lIns="91425" tIns="91425" rIns="91425" bIns="91425" anchor="b" anchorCtr="0">
             <a:noAutofit/>
           </a:bodyPr>
           <a:lstStyle/>
@@ -3364,9 +3590,11 @@
       <p:sp>
         <p:nvSpPr>
           <p:cNvPr id="43" name="Shape 43"/>
-          <p:cNvSpPr txBox="1"/>
+          <p:cNvSpPr txBox="1">
+            <a:spLocks noGrp="1"/>
+          </p:cNvSpPr>
           <p:nvPr>
-            <p:ph idx="1" type="body"/>
+            <p:ph type="body" idx="1"/>
           </p:nvPr>
         </p:nvSpPr>
         <p:spPr>
@@ -3379,12 +3607,12 @@
           </a:prstGeom>
         </p:spPr>
         <p:txBody>
-          <a:bodyPr anchorCtr="0" anchor="t" bIns="91425" lIns="91425" rIns="91425" tIns="91425">
+          <a:bodyPr lIns="91425" tIns="91425" rIns="91425" bIns="91425" anchor="t" anchorCtr="0">
             <a:noAutofit/>
           </a:bodyPr>
           <a:lstStyle/>
           <a:p>
-            <a:pPr indent="-419100" lvl="0" marL="457200" rtl="0">
+            <a:pPr marL="457200" lvl="0" indent="-419100" rtl="0">
               <a:spcBef>
                 <a:spcPts val="0"/>
               </a:spcBef>
@@ -3401,7 +3629,7 @@
             </a:r>
           </a:p>
           <a:p>
-            <a:pPr indent="-419100" lvl="0" marL="457200" rtl="0">
+            <a:pPr marL="457200" lvl="0" indent="-419100" rtl="0">
               <a:spcBef>
                 <a:spcPts val="0"/>
               </a:spcBef>
@@ -3418,7 +3646,7 @@
             </a:r>
           </a:p>
           <a:p>
-            <a:pPr indent="-419100" lvl="0" marL="457200" rtl="0">
+            <a:pPr marL="457200" lvl="0" indent="-419100" rtl="0">
               <a:spcBef>
                 <a:spcPts val="0"/>
               </a:spcBef>
@@ -3435,7 +3663,7 @@
             </a:r>
           </a:p>
           <a:p>
-            <a:pPr indent="-381000" lvl="1" marL="914400" rtl="0">
+            <a:pPr marL="914400" lvl="1" indent="-381000" rtl="0">
               <a:spcBef>
                 <a:spcPts val="0"/>
               </a:spcBef>
@@ -3452,7 +3680,7 @@
             </a:r>
           </a:p>
           <a:p>
-            <a:pPr indent="-381000" lvl="1" marL="914400" rtl="0">
+            <a:pPr marL="914400" lvl="1" indent="-381000" rtl="0">
               <a:spcBef>
                 <a:spcPts val="0"/>
               </a:spcBef>
@@ -3475,9 +3703,6 @@
               </a:spcBef>
               <a:buNone/>
             </a:pPr>
-            <a:r>
-              <a:t/>
-            </a:r>
             <a:endParaRPr/>
           </a:p>
           <a:p>
@@ -3487,9 +3712,6 @@
               </a:spcBef>
               <a:buNone/>
             </a:pPr>
-            <a:r>
-              <a:t/>
-            </a:r>
             <a:endParaRPr/>
           </a:p>
         </p:txBody>
@@ -3499,18 +3721,18 @@
   <p:clrMapOvr>
     <a:masterClrMapping/>
   </p:clrMapOvr>
-  <p:transition spd="slow">
+  <p:transition xmlns:p14="http://schemas.microsoft.com/office/powerpoint/2010/main" spd="slow">
     <p:cut/>
   </p:transition>
 </p:sld>
 </file>
 
 <file path=ppt/slides/slide4.xml><?xml version="1.0" encoding="utf-8"?>
-<p:sld xmlns:a="http://schemas.openxmlformats.org/drawingml/2006/main" xmlns:r="http://schemas.openxmlformats.org/officeDocument/2006/relationships" xmlns:mc="http://schemas.openxmlformats.org/markup-compatibility/2006" xmlns:mv="urn:schemas-microsoft-com:mac:vml" xmlns:p="http://schemas.openxmlformats.org/presentationml/2006/main" xmlns:c="http://schemas.openxmlformats.org/drawingml/2006/chart" xmlns:dgm="http://schemas.openxmlformats.org/drawingml/2006/diagram" xmlns:o="urn:schemas-microsoft-com:office:office" xmlns:v="urn:schemas-microsoft-com:vml" xmlns:pvml="urn:schemas-microsoft-com:office:powerpoint" xmlns:com="http://schemas.openxmlformats.org/drawingml/2006/compatibility" xmlns:p14="http://schemas.microsoft.com/office/powerpoint/2010/main">
+<p:sld xmlns:a="http://schemas.openxmlformats.org/drawingml/2006/main" xmlns:r="http://schemas.openxmlformats.org/officeDocument/2006/relationships" xmlns:p="http://schemas.openxmlformats.org/presentationml/2006/main">
   <p:cSld>
     <p:spTree>
       <p:nvGrpSpPr>
-        <p:cNvPr id="47" name="Shape 47"/>
+        <p:cNvPr id="1" name="Shape 47"/>
         <p:cNvGrpSpPr/>
         <p:nvPr/>
       </p:nvGrpSpPr>
@@ -3525,7 +3747,9 @@
       <p:sp>
         <p:nvSpPr>
           <p:cNvPr id="48" name="Shape 48"/>
-          <p:cNvSpPr txBox="1"/>
+          <p:cNvSpPr txBox="1">
+            <a:spLocks noGrp="1"/>
+          </p:cNvSpPr>
           <p:nvPr>
             <p:ph type="title"/>
           </p:nvPr>
@@ -3540,7 +3764,7 @@
           </a:prstGeom>
         </p:spPr>
         <p:txBody>
-          <a:bodyPr anchorCtr="0" anchor="b" bIns="91425" lIns="91425" rIns="91425" tIns="91425">
+          <a:bodyPr lIns="91425" tIns="91425" rIns="91425" bIns="91425" anchor="b" anchorCtr="0">
             <a:noAutofit/>
           </a:bodyPr>
           <a:lstStyle/>
@@ -3561,9 +3785,11 @@
       <p:sp>
         <p:nvSpPr>
           <p:cNvPr id="49" name="Shape 49"/>
-          <p:cNvSpPr txBox="1"/>
+          <p:cNvSpPr txBox="1">
+            <a:spLocks noGrp="1"/>
+          </p:cNvSpPr>
           <p:nvPr>
-            <p:ph idx="1" type="body"/>
+            <p:ph type="body" idx="1"/>
           </p:nvPr>
         </p:nvSpPr>
         <p:spPr>
@@ -3576,12 +3802,12 @@
           </a:prstGeom>
         </p:spPr>
         <p:txBody>
-          <a:bodyPr anchorCtr="0" anchor="t" bIns="91425" lIns="91425" rIns="91425" tIns="91425">
+          <a:bodyPr lIns="91425" tIns="91425" rIns="91425" bIns="91425" anchor="t" anchorCtr="0">
             <a:noAutofit/>
           </a:bodyPr>
           <a:lstStyle/>
           <a:p>
-            <a:pPr indent="-419100" lvl="0" marL="457200" rtl="0">
+            <a:pPr marL="457200" lvl="0" indent="-419100" rtl="0">
               <a:spcBef>
                 <a:spcPts val="0"/>
               </a:spcBef>
@@ -3598,7 +3824,7 @@
             </a:r>
           </a:p>
           <a:p>
-            <a:pPr indent="-419100" lvl="0" marL="457200" rtl="0">
+            <a:pPr marL="457200" lvl="0" indent="-419100" rtl="0">
               <a:spcBef>
                 <a:spcPts val="0"/>
               </a:spcBef>
@@ -3621,18 +3847,18 @@
   <p:clrMapOvr>
     <a:masterClrMapping/>
   </p:clrMapOvr>
-  <p:transition spd="slow">
+  <p:transition xmlns:p14="http://schemas.microsoft.com/office/powerpoint/2010/main" spd="slow">
     <p:cut/>
   </p:transition>
 </p:sld>
 </file>
 
 <file path=ppt/slides/slide5.xml><?xml version="1.0" encoding="utf-8"?>
-<p:sld xmlns:a="http://schemas.openxmlformats.org/drawingml/2006/main" xmlns:r="http://schemas.openxmlformats.org/officeDocument/2006/relationships" xmlns:mc="http://schemas.openxmlformats.org/markup-compatibility/2006" xmlns:mv="urn:schemas-microsoft-com:mac:vml" xmlns:p="http://schemas.openxmlformats.org/presentationml/2006/main" xmlns:c="http://schemas.openxmlformats.org/drawingml/2006/chart" xmlns:dgm="http://schemas.openxmlformats.org/drawingml/2006/diagram" xmlns:o="urn:schemas-microsoft-com:office:office" xmlns:v="urn:schemas-microsoft-com:vml" xmlns:pvml="urn:schemas-microsoft-com:office:powerpoint" xmlns:com="http://schemas.openxmlformats.org/drawingml/2006/compatibility" xmlns:p14="http://schemas.microsoft.com/office/powerpoint/2010/main">
+<p:sld xmlns:a="http://schemas.openxmlformats.org/drawingml/2006/main" xmlns:r="http://schemas.openxmlformats.org/officeDocument/2006/relationships" xmlns:p="http://schemas.openxmlformats.org/presentationml/2006/main">
   <p:cSld>
     <p:spTree>
       <p:nvGrpSpPr>
-        <p:cNvPr id="53" name="Shape 53"/>
+        <p:cNvPr id="1" name="Shape 53"/>
         <p:cNvGrpSpPr/>
         <p:nvPr/>
       </p:nvGrpSpPr>
@@ -3647,7 +3873,9 @@
       <p:sp>
         <p:nvSpPr>
           <p:cNvPr id="54" name="Shape 54"/>
-          <p:cNvSpPr txBox="1"/>
+          <p:cNvSpPr txBox="1">
+            <a:spLocks noGrp="1"/>
+          </p:cNvSpPr>
           <p:nvPr>
             <p:ph type="title"/>
           </p:nvPr>
@@ -3662,7 +3890,7 @@
           </a:prstGeom>
         </p:spPr>
         <p:txBody>
-          <a:bodyPr anchorCtr="0" anchor="b" bIns="91425" lIns="91425" rIns="91425" tIns="91425">
+          <a:bodyPr lIns="91425" tIns="91425" rIns="91425" bIns="91425" anchor="b" anchorCtr="0">
             <a:noAutofit/>
           </a:bodyPr>
           <a:lstStyle/>
@@ -3683,9 +3911,11 @@
       <p:sp>
         <p:nvSpPr>
           <p:cNvPr id="55" name="Shape 55"/>
-          <p:cNvSpPr txBox="1"/>
+          <p:cNvSpPr txBox="1">
+            <a:spLocks noGrp="1"/>
+          </p:cNvSpPr>
           <p:nvPr>
-            <p:ph idx="1" type="body"/>
+            <p:ph type="body" idx="1"/>
           </p:nvPr>
         </p:nvSpPr>
         <p:spPr>
@@ -3698,12 +3928,12 @@
           </a:prstGeom>
         </p:spPr>
         <p:txBody>
-          <a:bodyPr anchorCtr="0" anchor="t" bIns="91425" lIns="91425" rIns="91425" tIns="91425">
+          <a:bodyPr lIns="91425" tIns="91425" rIns="91425" bIns="91425" anchor="t" anchorCtr="0">
             <a:noAutofit/>
           </a:bodyPr>
           <a:lstStyle/>
           <a:p>
-            <a:pPr indent="-419100" lvl="0" marL="457200" rtl="0">
+            <a:pPr marL="457200" lvl="0" indent="-419100" rtl="0">
               <a:spcBef>
                 <a:spcPts val="0"/>
               </a:spcBef>
@@ -3720,7 +3950,7 @@
             </a:r>
           </a:p>
           <a:p>
-            <a:pPr indent="-419100" lvl="0" marL="457200" rtl="0">
+            <a:pPr marL="457200" lvl="0" indent="-419100" rtl="0">
               <a:spcBef>
                 <a:spcPts val="0"/>
               </a:spcBef>
@@ -3737,7 +3967,7 @@
             </a:r>
           </a:p>
           <a:p>
-            <a:pPr indent="-419100" lvl="0" marL="457200" rtl="0">
+            <a:pPr marL="457200" lvl="0" indent="-419100" rtl="0">
               <a:spcBef>
                 <a:spcPts val="0"/>
               </a:spcBef>
@@ -3754,7 +3984,7 @@
             </a:r>
           </a:p>
           <a:p>
-            <a:pPr indent="-419100" lvl="0" marL="457200" rtl="0">
+            <a:pPr marL="457200" lvl="0" indent="-419100" rtl="0">
               <a:spcBef>
                 <a:spcPts val="0"/>
               </a:spcBef>
@@ -3777,18 +4007,18 @@
   <p:clrMapOvr>
     <a:masterClrMapping/>
   </p:clrMapOvr>
-  <p:transition spd="slow">
+  <p:transition xmlns:p14="http://schemas.microsoft.com/office/powerpoint/2010/main" spd="slow">
     <p:cut/>
   </p:transition>
 </p:sld>
 </file>
 
 <file path=ppt/slides/slide6.xml><?xml version="1.0" encoding="utf-8"?>
-<p:sld xmlns:a="http://schemas.openxmlformats.org/drawingml/2006/main" xmlns:r="http://schemas.openxmlformats.org/officeDocument/2006/relationships" xmlns:mc="http://schemas.openxmlformats.org/markup-compatibility/2006" xmlns:mv="urn:schemas-microsoft-com:mac:vml" xmlns:p="http://schemas.openxmlformats.org/presentationml/2006/main" xmlns:c="http://schemas.openxmlformats.org/drawingml/2006/chart" xmlns:dgm="http://schemas.openxmlformats.org/drawingml/2006/diagram" xmlns:o="urn:schemas-microsoft-com:office:office" xmlns:v="urn:schemas-microsoft-com:vml" xmlns:pvml="urn:schemas-microsoft-com:office:powerpoint" xmlns:com="http://schemas.openxmlformats.org/drawingml/2006/compatibility" xmlns:p14="http://schemas.microsoft.com/office/powerpoint/2010/main">
+<p:sld xmlns:a="http://schemas.openxmlformats.org/drawingml/2006/main" xmlns:r="http://schemas.openxmlformats.org/officeDocument/2006/relationships" xmlns:p="http://schemas.openxmlformats.org/presentationml/2006/main">
   <p:cSld>
     <p:spTree>
       <p:nvGrpSpPr>
-        <p:cNvPr id="59" name="Shape 59"/>
+        <p:cNvPr id="1" name="Shape 59"/>
         <p:cNvGrpSpPr/>
         <p:nvPr/>
       </p:nvGrpSpPr>
@@ -3803,7 +4033,9 @@
       <p:sp>
         <p:nvSpPr>
           <p:cNvPr id="60" name="Shape 60"/>
-          <p:cNvSpPr txBox="1"/>
+          <p:cNvSpPr txBox="1">
+            <a:spLocks noGrp="1"/>
+          </p:cNvSpPr>
           <p:nvPr>
             <p:ph type="title"/>
           </p:nvPr>
@@ -3818,7 +4050,7 @@
           </a:prstGeom>
         </p:spPr>
         <p:txBody>
-          <a:bodyPr anchorCtr="0" anchor="b" bIns="91425" lIns="91425" rIns="91425" tIns="91425">
+          <a:bodyPr lIns="91425" tIns="91425" rIns="91425" bIns="91425" anchor="b" anchorCtr="0">
             <a:noAutofit/>
           </a:bodyPr>
           <a:lstStyle/>
@@ -3839,9 +4071,11 @@
       <p:sp>
         <p:nvSpPr>
           <p:cNvPr id="61" name="Shape 61"/>
-          <p:cNvSpPr txBox="1"/>
+          <p:cNvSpPr txBox="1">
+            <a:spLocks noGrp="1"/>
+          </p:cNvSpPr>
           <p:nvPr>
-            <p:ph idx="1" type="body"/>
+            <p:ph type="body" idx="1"/>
           </p:nvPr>
         </p:nvSpPr>
         <p:spPr>
@@ -3854,12 +4088,12 @@
           </a:prstGeom>
         </p:spPr>
         <p:txBody>
-          <a:bodyPr anchorCtr="0" anchor="t" bIns="91425" lIns="91425" rIns="91425" tIns="91425">
+          <a:bodyPr lIns="91425" tIns="91425" rIns="91425" bIns="91425" anchor="t" anchorCtr="0">
             <a:noAutofit/>
           </a:bodyPr>
           <a:lstStyle/>
           <a:p>
-            <a:pPr indent="-419100" lvl="0" marL="457200" rtl="0">
+            <a:pPr marL="457200" lvl="0" indent="-419100" rtl="0">
               <a:spcBef>
                 <a:spcPts val="0"/>
               </a:spcBef>
@@ -3876,7 +4110,7 @@
             </a:r>
           </a:p>
           <a:p>
-            <a:pPr indent="-419100" lvl="0" marL="457200" rtl="0">
+            <a:pPr marL="457200" lvl="0" indent="-419100" rtl="0">
               <a:spcBef>
                 <a:spcPts val="0"/>
               </a:spcBef>
@@ -3893,7 +4127,7 @@
             </a:r>
           </a:p>
           <a:p>
-            <a:pPr indent="-381000" lvl="1" marL="914400" rtl="0">
+            <a:pPr marL="914400" lvl="1" indent="-381000" rtl="0">
               <a:spcBef>
                 <a:spcPts val="0"/>
               </a:spcBef>
@@ -3910,7 +4144,7 @@
             </a:r>
           </a:p>
           <a:p>
-            <a:pPr indent="-419100" lvl="0" marL="457200" rtl="0">
+            <a:pPr marL="457200" lvl="0" indent="-419100" rtl="0">
               <a:spcBef>
                 <a:spcPts val="0"/>
               </a:spcBef>
@@ -3933,9 +4167,6 @@
               </a:spcBef>
               <a:buNone/>
             </a:pPr>
-            <a:r>
-              <a:t/>
-            </a:r>
             <a:endParaRPr/>
           </a:p>
         </p:txBody>
@@ -3945,14 +4176,399 @@
   <p:clrMapOvr>
     <a:masterClrMapping/>
   </p:clrMapOvr>
-  <p:transition spd="slow">
+  <p:transition xmlns:p14="http://schemas.microsoft.com/office/powerpoint/2010/main" spd="slow">
     <p:cut/>
   </p:transition>
 </p:sld>
 </file>
 
+<file path=ppt/slides/slide7.xml><?xml version="1.0" encoding="utf-8"?>
+<p:sld xmlns:a="http://schemas.openxmlformats.org/drawingml/2006/main" xmlns:r="http://schemas.openxmlformats.org/officeDocument/2006/relationships" xmlns:p="http://schemas.openxmlformats.org/presentationml/2006/main">
+  <p:cSld>
+    <p:spTree>
+      <p:nvGrpSpPr>
+        <p:cNvPr id="1" name=""/>
+        <p:cNvGrpSpPr/>
+        <p:nvPr/>
+      </p:nvGrpSpPr>
+      <p:grpSpPr>
+        <a:xfrm>
+          <a:off x="0" y="0"/>
+          <a:ext cx="0" cy="0"/>
+          <a:chOff x="0" y="0"/>
+          <a:chExt cx="0" cy="0"/>
+        </a:xfrm>
+      </p:grpSpPr>
+      <p:sp>
+        <p:nvSpPr>
+          <p:cNvPr id="2" name="Title 1"/>
+          <p:cNvSpPr>
+            <a:spLocks noGrp="1"/>
+          </p:cNvSpPr>
+          <p:nvPr>
+            <p:ph type="title"/>
+          </p:nvPr>
+        </p:nvSpPr>
+        <p:spPr/>
+        <p:txBody>
+          <a:bodyPr/>
+          <a:lstStyle/>
+          <a:p>
+            <a:endParaRPr lang="en-US"/>
+          </a:p>
+        </p:txBody>
+      </p:sp>
+      <p:sp>
+        <p:nvSpPr>
+          <p:cNvPr id="3" name="Text Placeholder 2"/>
+          <p:cNvSpPr>
+            <a:spLocks noGrp="1"/>
+          </p:cNvSpPr>
+          <p:nvPr>
+            <p:ph type="body" idx="1"/>
+          </p:nvPr>
+        </p:nvSpPr>
+        <p:spPr/>
+        <p:txBody>
+          <a:bodyPr/>
+          <a:lstStyle/>
+          <a:p>
+            <a:pPr marL="457200" indent="-457200">
+              <a:buFont typeface="Arial"/>
+              <a:buChar char="•"/>
+            </a:pPr>
+            <a:r>
+              <a:rPr lang="en-US" dirty="0">
+                <a:hlinkClick r:id="rId2"/>
+              </a:rPr>
+              <a:t>https://github.com/maxgurewitz/basic-</a:t>
+            </a:r>
+            <a:r>
+              <a:rPr lang="en-US" dirty="0" smtClean="0">
+                <a:hlinkClick r:id="rId2"/>
+              </a:rPr>
+              <a:t>chat</a:t>
+            </a:r>
+            <a:endParaRPr lang="en-US" dirty="0" smtClean="0"/>
+          </a:p>
+          <a:p>
+            <a:pPr marL="457200" indent="-457200">
+              <a:buFont typeface="Arial"/>
+              <a:buChar char="•"/>
+            </a:pPr>
+            <a:r>
+              <a:rPr lang="en-US" dirty="0"/>
+              <a:t>http://basic-</a:t>
+            </a:r>
+            <a:r>
+              <a:rPr lang="en-US" dirty="0" err="1"/>
+              <a:t>chat.herokuapp.com</a:t>
+            </a:r>
+            <a:r>
+              <a:rPr lang="en-US"/>
+              <a:t>/</a:t>
+            </a:r>
+            <a:endParaRPr lang="en-US" dirty="0"/>
+          </a:p>
+          <a:p>
+            <a:endParaRPr lang="en-US" dirty="0" smtClean="0"/>
+          </a:p>
+        </p:txBody>
+      </p:sp>
+    </p:spTree>
+    <p:extLst>
+      <p:ext uri="{BB962C8B-B14F-4D97-AF65-F5344CB8AC3E}">
+        <p14:creationId xmlns:p14="http://schemas.microsoft.com/office/powerpoint/2010/main" val="3920954008"/>
+      </p:ext>
+    </p:extLst>
+  </p:cSld>
+  <p:clrMapOvr>
+    <a:masterClrMapping/>
+  </p:clrMapOvr>
+</p:sld>
+</file>
+
 <file path=ppt/theme/theme1.xml><?xml version="1.0" encoding="utf-8"?>
-<a:theme xmlns:a="http://schemas.openxmlformats.org/drawingml/2006/main" xmlns:r="http://schemas.openxmlformats.org/officeDocument/2006/relationships" name="Custom Theme">
+<a:theme xmlns:a="http://schemas.openxmlformats.org/drawingml/2006/main" name="dark-gradient">
+  <a:themeElements>
+    <a:clrScheme name="Custom 346">
+      <a:dk1>
+        <a:srgbClr val="000000"/>
+      </a:dk1>
+      <a:lt1>
+        <a:srgbClr val="FFFFFF"/>
+      </a:lt1>
+      <a:dk2>
+        <a:srgbClr val="4C4C4C"/>
+      </a:dk2>
+      <a:lt2>
+        <a:srgbClr val="CCCCCC"/>
+      </a:lt2>
+      <a:accent1>
+        <a:srgbClr val="89B4B8"/>
+      </a:accent1>
+      <a:accent2>
+        <a:srgbClr val="AFA6CA"/>
+      </a:accent2>
+      <a:accent3>
+        <a:srgbClr val="A5B492"/>
+      </a:accent3>
+      <a:accent4>
+        <a:srgbClr val="E8CD6D"/>
+      </a:accent4>
+      <a:accent5>
+        <a:srgbClr val="F4A447"/>
+      </a:accent5>
+      <a:accent6>
+        <a:srgbClr val="D09D94"/>
+      </a:accent6>
+      <a:hlink>
+        <a:srgbClr val="5EA7AA"/>
+      </a:hlink>
+      <a:folHlink>
+        <a:srgbClr val="A295BE"/>
+      </a:folHlink>
+    </a:clrScheme>
+    <a:fontScheme name="Office">
+      <a:majorFont>
+        <a:latin typeface="Arial"/>
+        <a:ea typeface=""/>
+        <a:cs typeface=""/>
+        <a:font script="Jpan" typeface="ＭＳ Ｐゴシック"/>
+        <a:font script="Hang" typeface="맑은 고딕"/>
+        <a:font script="Hans" typeface="宋体"/>
+        <a:font script="Hant" typeface="新細明體"/>
+        <a:font script="Arab" typeface="Times New Roman"/>
+        <a:font script="Hebr" typeface="Times New Roman"/>
+        <a:font script="Thai" typeface="Angsana New"/>
+        <a:font script="Ethi" typeface="Nyala"/>
+        <a:font script="Beng" typeface="Vrinda"/>
+        <a:font script="Gujr" typeface="Shruti"/>
+        <a:font script="Khmr" typeface="MoolBoran"/>
+        <a:font script="Knda" typeface="Tunga"/>
+        <a:font script="Guru" typeface="Raavi"/>
+        <a:font script="Cans" typeface="Euphemia"/>
+        <a:font script="Cher" typeface="Plantagenet Cherokee"/>
+        <a:font script="Yiii" typeface="Microsoft Yi Baiti"/>
+        <a:font script="Tibt" typeface="Microsoft Himalaya"/>
+        <a:font script="Thaa" typeface="MV Boli"/>
+        <a:font script="Deva" typeface="Mangal"/>
+        <a:font script="Telu" typeface="Gautami"/>
+        <a:font script="Taml" typeface="Latha"/>
+        <a:font script="Syrc" typeface="Estrangelo Edessa"/>
+        <a:font script="Orya" typeface="Kalinga"/>
+        <a:font script="Mlym" typeface="Kartika"/>
+        <a:font script="Laoo" typeface="DokChampa"/>
+        <a:font script="Sinh" typeface="Iskoola Pota"/>
+        <a:font script="Mong" typeface="Mongolian Baiti"/>
+        <a:font script="Viet" typeface="Times New Roman"/>
+        <a:font script="Uigh" typeface="Microsoft Uighur"/>
+      </a:majorFont>
+      <a:minorFont>
+        <a:latin typeface="Arial"/>
+        <a:ea typeface=""/>
+        <a:cs typeface=""/>
+        <a:font script="Jpan" typeface="ＭＳ Ｐゴシック"/>
+        <a:font script="Hang" typeface="맑은 고딕"/>
+        <a:font script="Hans" typeface="宋体"/>
+        <a:font script="Hant" typeface="新細明體"/>
+        <a:font script="Arab" typeface="Times New Roman"/>
+        <a:font script="Hebr" typeface="Times New Roman"/>
+        <a:font script="Thai" typeface="Angsana New"/>
+        <a:font script="Ethi" typeface="Nyala"/>
+        <a:font script="Beng" typeface="Vrinda"/>
+        <a:font script="Gujr" typeface="Shruti"/>
+        <a:font script="Khmr" typeface="MoolBoran"/>
+        <a:font script="Knda" typeface="Tunga"/>
+        <a:font script="Guru" typeface="Raavi"/>
+        <a:font script="Cans" typeface="Euphemia"/>
+        <a:font script="Cher" typeface="Plantagenet Cherokee"/>
+        <a:font script="Yiii" typeface="Microsoft Yi Baiti"/>
+        <a:font script="Tibt" typeface="Microsoft Himalaya"/>
+        <a:font script="Thaa" typeface="MV Boli"/>
+        <a:font script="Deva" typeface="Mangal"/>
+        <a:font script="Telu" typeface="Gautami"/>
+        <a:font script="Taml" typeface="Latha"/>
+        <a:font script="Syrc" typeface="Estrangelo Edessa"/>
+        <a:font script="Orya" typeface="Kalinga"/>
+        <a:font script="Mlym" typeface="Kartika"/>
+        <a:font script="Laoo" typeface="DokChampa"/>
+        <a:font script="Sinh" typeface="Iskoola Pota"/>
+        <a:font script="Mong" typeface="Mongolian Baiti"/>
+        <a:font script="Viet" typeface="Times New Roman"/>
+        <a:font script="Uigh" typeface="Microsoft Uighur"/>
+      </a:minorFont>
+    </a:fontScheme>
+    <a:fmtScheme name="Office">
+      <a:fillStyleLst>
+        <a:solidFill>
+          <a:schemeClr val="phClr"/>
+        </a:solidFill>
+        <a:gradFill rotWithShape="1">
+          <a:gsLst>
+            <a:gs pos="0">
+              <a:schemeClr val="phClr">
+                <a:tint val="50000"/>
+                <a:satMod val="300000"/>
+              </a:schemeClr>
+            </a:gs>
+            <a:gs pos="35000">
+              <a:schemeClr val="phClr">
+                <a:tint val="37000"/>
+                <a:satMod val="300000"/>
+              </a:schemeClr>
+            </a:gs>
+            <a:gs pos="100000">
+              <a:schemeClr val="phClr">
+                <a:tint val="15000"/>
+                <a:satMod val="350000"/>
+              </a:schemeClr>
+            </a:gs>
+          </a:gsLst>
+          <a:lin ang="16200000" scaled="1"/>
+        </a:gradFill>
+        <a:gradFill rotWithShape="1">
+          <a:gsLst>
+            <a:gs pos="0">
+              <a:schemeClr val="phClr">
+                <a:tint val="100000"/>
+                <a:shade val="100000"/>
+                <a:satMod val="130000"/>
+              </a:schemeClr>
+            </a:gs>
+            <a:gs pos="100000">
+              <a:schemeClr val="phClr">
+                <a:tint val="50000"/>
+                <a:shade val="100000"/>
+                <a:satMod val="350000"/>
+              </a:schemeClr>
+            </a:gs>
+          </a:gsLst>
+          <a:lin ang="16200000" scaled="0"/>
+        </a:gradFill>
+      </a:fillStyleLst>
+      <a:lnStyleLst>
+        <a:ln w="9525" cap="flat" cmpd="sng" algn="ctr">
+          <a:solidFill>
+            <a:schemeClr val="phClr">
+              <a:shade val="95000"/>
+              <a:satMod val="105000"/>
+            </a:schemeClr>
+          </a:solidFill>
+          <a:prstDash val="solid"/>
+        </a:ln>
+        <a:ln w="25400" cap="flat" cmpd="sng" algn="ctr">
+          <a:solidFill>
+            <a:schemeClr val="phClr"/>
+          </a:solidFill>
+          <a:prstDash val="solid"/>
+        </a:ln>
+        <a:ln w="38100" cap="flat" cmpd="sng" algn="ctr">
+          <a:solidFill>
+            <a:schemeClr val="phClr"/>
+          </a:solidFill>
+          <a:prstDash val="solid"/>
+        </a:ln>
+      </a:lnStyleLst>
+      <a:effectStyleLst>
+        <a:effectStyle>
+          <a:effectLst>
+            <a:outerShdw blurRad="40000" dist="20000" dir="5400000" rotWithShape="0">
+              <a:srgbClr val="000000">
+                <a:alpha val="38000"/>
+              </a:srgbClr>
+            </a:outerShdw>
+          </a:effectLst>
+        </a:effectStyle>
+        <a:effectStyle>
+          <a:effectLst>
+            <a:outerShdw blurRad="40000" dist="23000" dir="5400000" rotWithShape="0">
+              <a:srgbClr val="000000">
+                <a:alpha val="35000"/>
+              </a:srgbClr>
+            </a:outerShdw>
+          </a:effectLst>
+        </a:effectStyle>
+        <a:effectStyle>
+          <a:effectLst>
+            <a:outerShdw blurRad="40000" dist="23000" dir="5400000" rotWithShape="0">
+              <a:srgbClr val="000000">
+                <a:alpha val="35000"/>
+              </a:srgbClr>
+            </a:outerShdw>
+          </a:effectLst>
+          <a:scene3d>
+            <a:camera prst="orthographicFront">
+              <a:rot lat="0" lon="0" rev="0"/>
+            </a:camera>
+            <a:lightRig rig="threePt" dir="t">
+              <a:rot lat="0" lon="0" rev="1200000"/>
+            </a:lightRig>
+          </a:scene3d>
+          <a:sp3d>
+            <a:bevelT w="63500" h="25400"/>
+          </a:sp3d>
+        </a:effectStyle>
+      </a:effectStyleLst>
+      <a:bgFillStyleLst>
+        <a:solidFill>
+          <a:schemeClr val="phClr"/>
+        </a:solidFill>
+        <a:gradFill rotWithShape="1">
+          <a:gsLst>
+            <a:gs pos="0">
+              <a:schemeClr val="phClr">
+                <a:tint val="40000"/>
+                <a:satMod val="350000"/>
+              </a:schemeClr>
+            </a:gs>
+            <a:gs pos="40000">
+              <a:schemeClr val="phClr">
+                <a:tint val="45000"/>
+                <a:shade val="99000"/>
+                <a:satMod val="350000"/>
+              </a:schemeClr>
+            </a:gs>
+            <a:gs pos="100000">
+              <a:schemeClr val="phClr">
+                <a:shade val="20000"/>
+                <a:satMod val="255000"/>
+              </a:schemeClr>
+            </a:gs>
+          </a:gsLst>
+          <a:path path="circle">
+            <a:fillToRect l="50000" t="-80000" r="50000" b="180000"/>
+          </a:path>
+        </a:gradFill>
+        <a:gradFill rotWithShape="1">
+          <a:gsLst>
+            <a:gs pos="0">
+              <a:schemeClr val="phClr">
+                <a:tint val="80000"/>
+                <a:satMod val="300000"/>
+              </a:schemeClr>
+            </a:gs>
+            <a:gs pos="100000">
+              <a:schemeClr val="phClr">
+                <a:shade val="30000"/>
+                <a:satMod val="200000"/>
+              </a:schemeClr>
+            </a:gs>
+          </a:gsLst>
+          <a:path path="circle">
+            <a:fillToRect l="50000" t="50000" r="50000" b="50000"/>
+          </a:path>
+        </a:gradFill>
+      </a:bgFillStyleLst>
+    </a:fmtScheme>
+  </a:themeElements>
+  <a:objectDefaults/>
+  <a:extraClrSchemeLst/>
+</a:theme>
+</file>
+
+<file path=ppt/theme/theme2.xml><?xml version="1.0" encoding="utf-8"?>
+<a:theme xmlns:a="http://schemas.openxmlformats.org/drawingml/2006/main" name="Custom Theme">
   <a:themeElements>
     <a:clrScheme name="Default">
       <a:dk1>
@@ -4111,7 +4727,7 @@
         </a:gradFill>
       </a:fillStyleLst>
       <a:lnStyleLst>
-        <a:ln cap="flat" cmpd="sng" w="9525" algn="ctr">
+        <a:ln w="9525" cap="flat" cmpd="sng" algn="ctr">
           <a:solidFill>
             <a:schemeClr val="phClr">
               <a:shade val="95000"/>
@@ -4120,13 +4736,13 @@
           </a:solidFill>
           <a:prstDash val="solid"/>
         </a:ln>
-        <a:ln cap="flat" cmpd="sng" w="25400" algn="ctr">
+        <a:ln w="25400" cap="flat" cmpd="sng" algn="ctr">
           <a:solidFill>
             <a:schemeClr val="phClr"/>
           </a:solidFill>
           <a:prstDash val="solid"/>
         </a:ln>
-        <a:ln cap="flat" cmpd="sng" w="38100" algn="ctr">
+        <a:ln w="38100" cap="flat" cmpd="sng" algn="ctr">
           <a:solidFill>
             <a:schemeClr val="phClr"/>
           </a:solidFill>
@@ -4136,7 +4752,7 @@
       <a:effectStyleLst>
         <a:effectStyle>
           <a:effectLst>
-            <a:outerShdw blurRad="40000" rotWithShape="0" dir="5400000" dist="20000">
+            <a:outerShdw blurRad="40000" dist="20000" dir="5400000" rotWithShape="0">
               <a:srgbClr val="000000">
                 <a:alpha val="38000"/>
               </a:srgbClr>
@@ -4145,7 +4761,7 @@
         </a:effectStyle>
         <a:effectStyle>
           <a:effectLst>
-            <a:outerShdw blurRad="40000" rotWithShape="0" dir="5400000" dist="23000">
+            <a:outerShdw blurRad="40000" dist="23000" dir="5400000" rotWithShape="0">
               <a:srgbClr val="000000">
                 <a:alpha val="35000"/>
               </a:srgbClr>
@@ -4154,7 +4770,7 @@
         </a:effectStyle>
         <a:effectStyle>
           <a:effectLst>
-            <a:outerShdw blurRad="40000" rotWithShape="0" dir="5400000" dist="23000">
+            <a:outerShdw blurRad="40000" dist="23000" dir="5400000" rotWithShape="0">
               <a:srgbClr val="000000">
                 <a:alpha val="35000"/>
               </a:srgbClr>
@@ -4164,12 +4780,12 @@
             <a:camera prst="orthographicFront">
               <a:rot lat="0" lon="0" rev="0"/>
             </a:camera>
-            <a:lightRig dir="t" rig="threePt">
+            <a:lightRig rig="threePt" dir="t">
               <a:rot lat="0" lon="0" rev="1200000"/>
             </a:lightRig>
           </a:scene3d>
           <a:sp3d>
-            <a:bevelT h="25400" w="63500"/>
+            <a:bevelT w="63500" h="25400"/>
           </a:sp3d>
         </a:effectStyle>
       </a:effectStyleLst>
@@ -4200,7 +4816,7 @@
             </a:gs>
           </a:gsLst>
           <a:path path="circle">
-            <a:fillToRect b="180000" l="50000" r="50000" t="-80000"/>
+            <a:fillToRect l="50000" t="-80000" r="50000" b="180000"/>
           </a:path>
         </a:gradFill>
         <a:gradFill rotWithShape="1">
@@ -4219,605 +4835,13 @@
             </a:gs>
           </a:gsLst>
           <a:path path="circle">
-            <a:fillToRect b="50000" l="50000" r="50000" t="50000"/>
+            <a:fillToRect l="50000" t="50000" r="50000" b="50000"/>
           </a:path>
         </a:gradFill>
       </a:bgFillStyleLst>
     </a:fmtScheme>
   </a:themeElements>
-</a:theme>
-</file>
-
-<file path=ppt/theme/theme2.xml><?xml version="1.0" encoding="utf-8"?>
-<a:theme xmlns:a="http://schemas.openxmlformats.org/drawingml/2006/main" xmlns:r="http://schemas.openxmlformats.org/officeDocument/2006/relationships" name="Office Theme">
-  <a:themeElements>
-    <a:clrScheme name="Office">
-      <a:dk1>
-        <a:sysClr lastClr="000000" val="windowText"/>
-      </a:dk1>
-      <a:lt1>
-        <a:sysClr lastClr="FFFFFF" val="window"/>
-      </a:lt1>
-      <a:dk2>
-        <a:srgbClr val="1F497D"/>
-      </a:dk2>
-      <a:lt2>
-        <a:srgbClr val="EEECE1"/>
-      </a:lt2>
-      <a:accent1>
-        <a:srgbClr val="4F81BD"/>
-      </a:accent1>
-      <a:accent2>
-        <a:srgbClr val="C0504D"/>
-      </a:accent2>
-      <a:accent3>
-        <a:srgbClr val="9BBB59"/>
-      </a:accent3>
-      <a:accent4>
-        <a:srgbClr val="8064A2"/>
-      </a:accent4>
-      <a:accent5>
-        <a:srgbClr val="4BACC6"/>
-      </a:accent5>
-      <a:accent6>
-        <a:srgbClr val="F79646"/>
-      </a:accent6>
-      <a:hlink>
-        <a:srgbClr val="0000FF"/>
-      </a:hlink>
-      <a:folHlink>
-        <a:srgbClr val="800080"/>
-      </a:folHlink>
-    </a:clrScheme>
-    <a:fontScheme name="Office">
-      <a:majorFont>
-        <a:latin typeface="Arial"/>
-        <a:ea typeface=""/>
-        <a:cs typeface=""/>
-        <a:font script="Jpan" typeface="ＭＳ Ｐゴシック"/>
-        <a:font script="Hang" typeface="맑은 고딕"/>
-        <a:font script="Hans" typeface="宋体"/>
-        <a:font script="Hant" typeface="新細明體"/>
-        <a:font script="Arab" typeface="Times New Roman"/>
-        <a:font script="Hebr" typeface="Times New Roman"/>
-        <a:font script="Thai" typeface="Angsana New"/>
-        <a:font script="Ethi" typeface="Nyala"/>
-        <a:font script="Beng" typeface="Vrinda"/>
-        <a:font script="Gujr" typeface="Shruti"/>
-        <a:font script="Khmr" typeface="MoolBoran"/>
-        <a:font script="Knda" typeface="Tunga"/>
-        <a:font script="Guru" typeface="Raavi"/>
-        <a:font script="Cans" typeface="Euphemia"/>
-        <a:font script="Cher" typeface="Plantagenet Cherokee"/>
-        <a:font script="Yiii" typeface="Microsoft Yi Baiti"/>
-        <a:font script="Tibt" typeface="Microsoft Himalaya"/>
-        <a:font script="Thaa" typeface="MV Boli"/>
-        <a:font script="Deva" typeface="Mangal"/>
-        <a:font script="Telu" typeface="Gautami"/>
-        <a:font script="Taml" typeface="Latha"/>
-        <a:font script="Syrc" typeface="Estrangelo Edessa"/>
-        <a:font script="Orya" typeface="Kalinga"/>
-        <a:font script="Mlym" typeface="Kartika"/>
-        <a:font script="Laoo" typeface="DokChampa"/>
-        <a:font script="Sinh" typeface="Iskoola Pota"/>
-        <a:font script="Mong" typeface="Mongolian Baiti"/>
-        <a:font script="Viet" typeface="Times New Roman"/>
-        <a:font script="Uigh" typeface="Microsoft Uighur"/>
-      </a:majorFont>
-      <a:minorFont>
-        <a:latin typeface="Arial"/>
-        <a:ea typeface=""/>
-        <a:cs typeface=""/>
-        <a:font script="Jpan" typeface="ＭＳ Ｐゴシック"/>
-        <a:font script="Hang" typeface="맑은 고딕"/>
-        <a:font script="Hans" typeface="宋体"/>
-        <a:font script="Hant" typeface="新細明體"/>
-        <a:font script="Arab" typeface="Times New Roman"/>
-        <a:font script="Hebr" typeface="Times New Roman"/>
-        <a:font script="Thai" typeface="Angsana New"/>
-        <a:font script="Ethi" typeface="Nyala"/>
-        <a:font script="Beng" typeface="Vrinda"/>
-        <a:font script="Gujr" typeface="Shruti"/>
-        <a:font script="Khmr" typeface="MoolBoran"/>
-        <a:font script="Knda" typeface="Tunga"/>
-        <a:font script="Guru" typeface="Raavi"/>
-        <a:font script="Cans" typeface="Euphemia"/>
-        <a:font script="Cher" typeface="Plantagenet Cherokee"/>
-        <a:font script="Yiii" typeface="Microsoft Yi Baiti"/>
-        <a:font script="Tibt" typeface="Microsoft Himalaya"/>
-        <a:font script="Thaa" typeface="MV Boli"/>
-        <a:font script="Deva" typeface="Mangal"/>
-        <a:font script="Telu" typeface="Gautami"/>
-        <a:font script="Taml" typeface="Latha"/>
-        <a:font script="Syrc" typeface="Estrangelo Edessa"/>
-        <a:font script="Orya" typeface="Kalinga"/>
-        <a:font script="Mlym" typeface="Kartika"/>
-        <a:font script="Laoo" typeface="DokChampa"/>
-        <a:font script="Sinh" typeface="Iskoola Pota"/>
-        <a:font script="Mong" typeface="Mongolian Baiti"/>
-        <a:font script="Viet" typeface="Times New Roman"/>
-        <a:font script="Uigh" typeface="Microsoft Uighur"/>
-      </a:minorFont>
-    </a:fontScheme>
-    <a:fmtScheme name="Office">
-      <a:fillStyleLst>
-        <a:solidFill>
-          <a:schemeClr val="phClr"/>
-        </a:solidFill>
-        <a:gradFill rotWithShape="1">
-          <a:gsLst>
-            <a:gs pos="0">
-              <a:schemeClr val="phClr">
-                <a:tint val="50000"/>
-                <a:satMod val="300000"/>
-              </a:schemeClr>
-            </a:gs>
-            <a:gs pos="35000">
-              <a:schemeClr val="phClr">
-                <a:tint val="37000"/>
-                <a:satMod val="300000"/>
-              </a:schemeClr>
-            </a:gs>
-            <a:gs pos="100000">
-              <a:schemeClr val="phClr">
-                <a:tint val="15000"/>
-                <a:satMod val="350000"/>
-              </a:schemeClr>
-            </a:gs>
-          </a:gsLst>
-          <a:lin ang="16200000" scaled="1"/>
-        </a:gradFill>
-        <a:gradFill rotWithShape="1">
-          <a:gsLst>
-            <a:gs pos="0">
-              <a:schemeClr val="phClr">
-                <a:tint val="100000"/>
-                <a:shade val="100000"/>
-                <a:satMod val="130000"/>
-              </a:schemeClr>
-            </a:gs>
-            <a:gs pos="100000">
-              <a:schemeClr val="phClr">
-                <a:tint val="50000"/>
-                <a:shade val="100000"/>
-                <a:satMod val="350000"/>
-              </a:schemeClr>
-            </a:gs>
-          </a:gsLst>
-          <a:lin ang="16200000" scaled="0"/>
-        </a:gradFill>
-      </a:fillStyleLst>
-      <a:lnStyleLst>
-        <a:ln cap="flat" cmpd="sng" w="9525" algn="ctr">
-          <a:solidFill>
-            <a:schemeClr val="phClr">
-              <a:shade val="95000"/>
-              <a:satMod val="105000"/>
-            </a:schemeClr>
-          </a:solidFill>
-          <a:prstDash val="solid"/>
-        </a:ln>
-        <a:ln cap="flat" cmpd="sng" w="25400" algn="ctr">
-          <a:solidFill>
-            <a:schemeClr val="phClr"/>
-          </a:solidFill>
-          <a:prstDash val="solid"/>
-        </a:ln>
-        <a:ln cap="flat" cmpd="sng" w="38100" algn="ctr">
-          <a:solidFill>
-            <a:schemeClr val="phClr"/>
-          </a:solidFill>
-          <a:prstDash val="solid"/>
-        </a:ln>
-      </a:lnStyleLst>
-      <a:effectStyleLst>
-        <a:effectStyle>
-          <a:effectLst>
-            <a:outerShdw blurRad="40000" rotWithShape="0" dir="5400000" dist="20000">
-              <a:srgbClr val="000000">
-                <a:alpha val="38000"/>
-              </a:srgbClr>
-            </a:outerShdw>
-          </a:effectLst>
-        </a:effectStyle>
-        <a:effectStyle>
-          <a:effectLst>
-            <a:outerShdw blurRad="40000" rotWithShape="0" dir="5400000" dist="23000">
-              <a:srgbClr val="000000">
-                <a:alpha val="35000"/>
-              </a:srgbClr>
-            </a:outerShdw>
-          </a:effectLst>
-        </a:effectStyle>
-        <a:effectStyle>
-          <a:effectLst>
-            <a:outerShdw blurRad="40000" rotWithShape="0" dir="5400000" dist="23000">
-              <a:srgbClr val="000000">
-                <a:alpha val="35000"/>
-              </a:srgbClr>
-            </a:outerShdw>
-          </a:effectLst>
-          <a:scene3d>
-            <a:camera prst="orthographicFront">
-              <a:rot lat="0" lon="0" rev="0"/>
-            </a:camera>
-            <a:lightRig dir="t" rig="threePt">
-              <a:rot lat="0" lon="0" rev="1200000"/>
-            </a:lightRig>
-          </a:scene3d>
-          <a:sp3d>
-            <a:bevelT h="25400" w="63500"/>
-          </a:sp3d>
-        </a:effectStyle>
-      </a:effectStyleLst>
-      <a:bgFillStyleLst>
-        <a:solidFill>
-          <a:schemeClr val="phClr"/>
-        </a:solidFill>
-        <a:gradFill rotWithShape="1">
-          <a:gsLst>
-            <a:gs pos="0">
-              <a:schemeClr val="phClr">
-                <a:tint val="40000"/>
-                <a:satMod val="350000"/>
-              </a:schemeClr>
-            </a:gs>
-            <a:gs pos="40000">
-              <a:schemeClr val="phClr">
-                <a:tint val="45000"/>
-                <a:shade val="99000"/>
-                <a:satMod val="350000"/>
-              </a:schemeClr>
-            </a:gs>
-            <a:gs pos="100000">
-              <a:schemeClr val="phClr">
-                <a:shade val="20000"/>
-                <a:satMod val="255000"/>
-              </a:schemeClr>
-            </a:gs>
-          </a:gsLst>
-          <a:path path="circle">
-            <a:fillToRect b="180000" l="50000" r="50000" t="-80000"/>
-          </a:path>
-        </a:gradFill>
-        <a:gradFill rotWithShape="1">
-          <a:gsLst>
-            <a:gs pos="0">
-              <a:schemeClr val="phClr">
-                <a:tint val="80000"/>
-                <a:satMod val="300000"/>
-              </a:schemeClr>
-            </a:gs>
-            <a:gs pos="100000">
-              <a:schemeClr val="phClr">
-                <a:shade val="30000"/>
-                <a:satMod val="200000"/>
-              </a:schemeClr>
-            </a:gs>
-          </a:gsLst>
-          <a:path path="circle">
-            <a:fillToRect b="50000" l="50000" r="50000" t="50000"/>
-          </a:path>
-        </a:gradFill>
-      </a:bgFillStyleLst>
-    </a:fmtScheme>
-  </a:themeElements>
-  <a:objectDefaults>
-    <a:spDef>
-      <a:spPr/>
-      <a:bodyPr/>
-      <a:lstStyle/>
-      <a:style>
-        <a:lnRef idx="1">
-          <a:schemeClr val="accent1"/>
-        </a:lnRef>
-        <a:fillRef idx="3">
-          <a:schemeClr val="accent1"/>
-        </a:fillRef>
-        <a:effectRef idx="2">
-          <a:schemeClr val="accent1"/>
-        </a:effectRef>
-        <a:fontRef idx="minor">
-          <a:schemeClr val="lt1"/>
-        </a:fontRef>
-      </a:style>
-    </a:spDef>
-    <a:lnDef>
-      <a:spPr/>
-      <a:bodyPr/>
-      <a:lstStyle/>
-      <a:style>
-        <a:lnRef idx="2">
-          <a:schemeClr val="accent1"/>
-        </a:lnRef>
-        <a:fillRef idx="0">
-          <a:schemeClr val="accent1"/>
-        </a:fillRef>
-        <a:effectRef idx="1">
-          <a:schemeClr val="accent1"/>
-        </a:effectRef>
-        <a:fontRef idx="minor">
-          <a:schemeClr val="tx1"/>
-        </a:fontRef>
-      </a:style>
-    </a:lnDef>
-  </a:objectDefaults>
-</a:theme>
-</file>
-
-<file path=ppt/theme/theme3.xml><?xml version="1.0" encoding="utf-8"?>
-<a:theme xmlns:a="http://schemas.openxmlformats.org/drawingml/2006/main" xmlns:r="http://schemas.openxmlformats.org/officeDocument/2006/relationships" name="dark-gradient">
-  <a:themeElements>
-    <a:clrScheme name="Custom 346">
-      <a:dk1>
-        <a:srgbClr val="000000"/>
-      </a:dk1>
-      <a:lt1>
-        <a:srgbClr val="FFFFFF"/>
-      </a:lt1>
-      <a:dk2>
-        <a:srgbClr val="4C4C4C"/>
-      </a:dk2>
-      <a:lt2>
-        <a:srgbClr val="CCCCCC"/>
-      </a:lt2>
-      <a:accent1>
-        <a:srgbClr val="89B4B8"/>
-      </a:accent1>
-      <a:accent2>
-        <a:srgbClr val="AFA6CA"/>
-      </a:accent2>
-      <a:accent3>
-        <a:srgbClr val="A5B492"/>
-      </a:accent3>
-      <a:accent4>
-        <a:srgbClr val="E8CD6D"/>
-      </a:accent4>
-      <a:accent5>
-        <a:srgbClr val="F4A447"/>
-      </a:accent5>
-      <a:accent6>
-        <a:srgbClr val="D09D94"/>
-      </a:accent6>
-      <a:hlink>
-        <a:srgbClr val="5EA7AA"/>
-      </a:hlink>
-      <a:folHlink>
-        <a:srgbClr val="A295BE"/>
-      </a:folHlink>
-    </a:clrScheme>
-    <a:fontScheme name="Office">
-      <a:majorFont>
-        <a:latin typeface="Arial"/>
-        <a:ea typeface=""/>
-        <a:cs typeface=""/>
-        <a:font script="Jpan" typeface="ＭＳ Ｐゴシック"/>
-        <a:font script="Hang" typeface="맑은 고딕"/>
-        <a:font script="Hans" typeface="宋体"/>
-        <a:font script="Hant" typeface="新細明體"/>
-        <a:font script="Arab" typeface="Times New Roman"/>
-        <a:font script="Hebr" typeface="Times New Roman"/>
-        <a:font script="Thai" typeface="Angsana New"/>
-        <a:font script="Ethi" typeface="Nyala"/>
-        <a:font script="Beng" typeface="Vrinda"/>
-        <a:font script="Gujr" typeface="Shruti"/>
-        <a:font script="Khmr" typeface="MoolBoran"/>
-        <a:font script="Knda" typeface="Tunga"/>
-        <a:font script="Guru" typeface="Raavi"/>
-        <a:font script="Cans" typeface="Euphemia"/>
-        <a:font script="Cher" typeface="Plantagenet Cherokee"/>
-        <a:font script="Yiii" typeface="Microsoft Yi Baiti"/>
-        <a:font script="Tibt" typeface="Microsoft Himalaya"/>
-        <a:font script="Thaa" typeface="MV Boli"/>
-        <a:font script="Deva" typeface="Mangal"/>
-        <a:font script="Telu" typeface="Gautami"/>
-        <a:font script="Taml" typeface="Latha"/>
-        <a:font script="Syrc" typeface="Estrangelo Edessa"/>
-        <a:font script="Orya" typeface="Kalinga"/>
-        <a:font script="Mlym" typeface="Kartika"/>
-        <a:font script="Laoo" typeface="DokChampa"/>
-        <a:font script="Sinh" typeface="Iskoola Pota"/>
-        <a:font script="Mong" typeface="Mongolian Baiti"/>
-        <a:font script="Viet" typeface="Times New Roman"/>
-        <a:font script="Uigh" typeface="Microsoft Uighur"/>
-      </a:majorFont>
-      <a:minorFont>
-        <a:latin typeface="Arial"/>
-        <a:ea typeface=""/>
-        <a:cs typeface=""/>
-        <a:font script="Jpan" typeface="ＭＳ Ｐゴシック"/>
-        <a:font script="Hang" typeface="맑은 고딕"/>
-        <a:font script="Hans" typeface="宋体"/>
-        <a:font script="Hant" typeface="新細明體"/>
-        <a:font script="Arab" typeface="Times New Roman"/>
-        <a:font script="Hebr" typeface="Times New Roman"/>
-        <a:font script="Thai" typeface="Angsana New"/>
-        <a:font script="Ethi" typeface="Nyala"/>
-        <a:font script="Beng" typeface="Vrinda"/>
-        <a:font script="Gujr" typeface="Shruti"/>
-        <a:font script="Khmr" typeface="MoolBoran"/>
-        <a:font script="Knda" typeface="Tunga"/>
-        <a:font script="Guru" typeface="Raavi"/>
-        <a:font script="Cans" typeface="Euphemia"/>
-        <a:font script="Cher" typeface="Plantagenet Cherokee"/>
-        <a:font script="Yiii" typeface="Microsoft Yi Baiti"/>
-        <a:font script="Tibt" typeface="Microsoft Himalaya"/>
-        <a:font script="Thaa" typeface="MV Boli"/>
-        <a:font script="Deva" typeface="Mangal"/>
-        <a:font script="Telu" typeface="Gautami"/>
-        <a:font script="Taml" typeface="Latha"/>
-        <a:font script="Syrc" typeface="Estrangelo Edessa"/>
-        <a:font script="Orya" typeface="Kalinga"/>
-        <a:font script="Mlym" typeface="Kartika"/>
-        <a:font script="Laoo" typeface="DokChampa"/>
-        <a:font script="Sinh" typeface="Iskoola Pota"/>
-        <a:font script="Mong" typeface="Mongolian Baiti"/>
-        <a:font script="Viet" typeface="Times New Roman"/>
-        <a:font script="Uigh" typeface="Microsoft Uighur"/>
-      </a:minorFont>
-    </a:fontScheme>
-    <a:fmtScheme name="Office">
-      <a:fillStyleLst>
-        <a:solidFill>
-          <a:schemeClr val="phClr"/>
-        </a:solidFill>
-        <a:gradFill rotWithShape="1">
-          <a:gsLst>
-            <a:gs pos="0">
-              <a:schemeClr val="phClr">
-                <a:tint val="50000"/>
-                <a:satMod val="300000"/>
-              </a:schemeClr>
-            </a:gs>
-            <a:gs pos="35000">
-              <a:schemeClr val="phClr">
-                <a:tint val="37000"/>
-                <a:satMod val="300000"/>
-              </a:schemeClr>
-            </a:gs>
-            <a:gs pos="100000">
-              <a:schemeClr val="phClr">
-                <a:tint val="15000"/>
-                <a:satMod val="350000"/>
-              </a:schemeClr>
-            </a:gs>
-          </a:gsLst>
-          <a:lin ang="16200000" scaled="1"/>
-        </a:gradFill>
-        <a:gradFill rotWithShape="1">
-          <a:gsLst>
-            <a:gs pos="0">
-              <a:schemeClr val="phClr">
-                <a:tint val="100000"/>
-                <a:shade val="100000"/>
-                <a:satMod val="130000"/>
-              </a:schemeClr>
-            </a:gs>
-            <a:gs pos="100000">
-              <a:schemeClr val="phClr">
-                <a:tint val="50000"/>
-                <a:shade val="100000"/>
-                <a:satMod val="350000"/>
-              </a:schemeClr>
-            </a:gs>
-          </a:gsLst>
-          <a:lin ang="16200000" scaled="0"/>
-        </a:gradFill>
-      </a:fillStyleLst>
-      <a:lnStyleLst>
-        <a:ln cap="flat" cmpd="sng" w="9525" algn="ctr">
-          <a:solidFill>
-            <a:schemeClr val="phClr">
-              <a:shade val="95000"/>
-              <a:satMod val="105000"/>
-            </a:schemeClr>
-          </a:solidFill>
-          <a:prstDash val="solid"/>
-        </a:ln>
-        <a:ln cap="flat" cmpd="sng" w="25400" algn="ctr">
-          <a:solidFill>
-            <a:schemeClr val="phClr"/>
-          </a:solidFill>
-          <a:prstDash val="solid"/>
-        </a:ln>
-        <a:ln cap="flat" cmpd="sng" w="38100" algn="ctr">
-          <a:solidFill>
-            <a:schemeClr val="phClr"/>
-          </a:solidFill>
-          <a:prstDash val="solid"/>
-        </a:ln>
-      </a:lnStyleLst>
-      <a:effectStyleLst>
-        <a:effectStyle>
-          <a:effectLst>
-            <a:outerShdw blurRad="40000" rotWithShape="0" dir="5400000" dist="20000">
-              <a:srgbClr val="000000">
-                <a:alpha val="38000"/>
-              </a:srgbClr>
-            </a:outerShdw>
-          </a:effectLst>
-        </a:effectStyle>
-        <a:effectStyle>
-          <a:effectLst>
-            <a:outerShdw blurRad="40000" rotWithShape="0" dir="5400000" dist="23000">
-              <a:srgbClr val="000000">
-                <a:alpha val="35000"/>
-              </a:srgbClr>
-            </a:outerShdw>
-          </a:effectLst>
-        </a:effectStyle>
-        <a:effectStyle>
-          <a:effectLst>
-            <a:outerShdw blurRad="40000" rotWithShape="0" dir="5400000" dist="23000">
-              <a:srgbClr val="000000">
-                <a:alpha val="35000"/>
-              </a:srgbClr>
-            </a:outerShdw>
-          </a:effectLst>
-          <a:scene3d>
-            <a:camera prst="orthographicFront">
-              <a:rot lat="0" lon="0" rev="0"/>
-            </a:camera>
-            <a:lightRig dir="t" rig="threePt">
-              <a:rot lat="0" lon="0" rev="1200000"/>
-            </a:lightRig>
-          </a:scene3d>
-          <a:sp3d>
-            <a:bevelT h="25400" w="63500"/>
-          </a:sp3d>
-        </a:effectStyle>
-      </a:effectStyleLst>
-      <a:bgFillStyleLst>
-        <a:solidFill>
-          <a:schemeClr val="phClr"/>
-        </a:solidFill>
-        <a:gradFill rotWithShape="1">
-          <a:gsLst>
-            <a:gs pos="0">
-              <a:schemeClr val="phClr">
-                <a:tint val="40000"/>
-                <a:satMod val="350000"/>
-              </a:schemeClr>
-            </a:gs>
-            <a:gs pos="40000">
-              <a:schemeClr val="phClr">
-                <a:tint val="45000"/>
-                <a:shade val="99000"/>
-                <a:satMod val="350000"/>
-              </a:schemeClr>
-            </a:gs>
-            <a:gs pos="100000">
-              <a:schemeClr val="phClr">
-                <a:shade val="20000"/>
-                <a:satMod val="255000"/>
-              </a:schemeClr>
-            </a:gs>
-          </a:gsLst>
-          <a:path path="circle">
-            <a:fillToRect b="180000" l="50000" r="50000" t="-80000"/>
-          </a:path>
-        </a:gradFill>
-        <a:gradFill rotWithShape="1">
-          <a:gsLst>
-            <a:gs pos="0">
-              <a:schemeClr val="phClr">
-                <a:tint val="80000"/>
-                <a:satMod val="300000"/>
-              </a:schemeClr>
-            </a:gs>
-            <a:gs pos="100000">
-              <a:schemeClr val="phClr">
-                <a:shade val="30000"/>
-                <a:satMod val="200000"/>
-              </a:schemeClr>
-            </a:gs>
-          </a:gsLst>
-          <a:path path="circle">
-            <a:fillToRect b="50000" l="50000" r="50000" t="50000"/>
-          </a:path>
-        </a:gradFill>
-      </a:bgFillStyleLst>
-    </a:fmtScheme>
-  </a:themeElements>
+  <a:objectDefaults/>
+  <a:extraClrSchemeLst/>
 </a:theme>
 </file>
</xml_diff>

<commit_message>
update powerpoint and add comments
</commit_message>
<xml_diff>
--- a/resources/frp chat.pptx
+++ b/resources/frp chat.pptx
@@ -634,8 +634,8 @@
         </p:nvSpPr>
         <p:spPr>
           <a:xfrm>
-            <a:off x="381187" y="685800"/>
-            <a:ext cx="6096299" cy="3429000"/>
+            <a:off x="381000" y="685800"/>
+            <a:ext cx="6096000" cy="3429000"/>
           </a:xfrm>
           <a:custGeom>
             <a:avLst/>
@@ -967,8 +967,8 @@
         </p:nvSpPr>
         <p:spPr>
           <a:xfrm>
-            <a:off x="381187" y="685800"/>
-            <a:ext cx="6096299" cy="3429000"/>
+            <a:off x="381000" y="685800"/>
+            <a:ext cx="6096000" cy="3429000"/>
           </a:xfrm>
           <a:custGeom>
             <a:avLst/>
@@ -3386,6 +3386,13 @@
   <p:transition xmlns:p14="http://schemas.microsoft.com/office/powerpoint/2010/main" spd="slow">
     <p:cut/>
   </p:transition>
+  <p:timing>
+    <p:tnLst>
+      <p:par>
+        <p:cTn xmlns:p14="http://schemas.microsoft.com/office/powerpoint/2010/main" id="1" dur="indefinite" restart="never" nodeType="tmRoot"/>
+      </p:par>
+    </p:tnLst>
+  </p:timing>
 </p:sld>
 </file>
 
@@ -3481,7 +3488,7 @@
               <a:buChar char="●"/>
             </a:pPr>
             <a:r>
-              <a:rPr lang="en"/>
+              <a:rPr lang="en" dirty="0"/>
               <a:t>Functional Reactive Programming.</a:t>
             </a:r>
           </a:p>
@@ -3498,25 +3505,12 @@
               <a:buChar char="●"/>
             </a:pPr>
             <a:r>
-              <a:rPr lang="en"/>
-              <a:t>It’s a heuristic.  No rigorous definition.</a:t>
+              <a:rPr lang="en" dirty="0" smtClean="0"/>
+              <a:t>It’s </a:t>
             </a:r>
-          </a:p>
-          <a:p>
-            <a:pPr marL="457200" lvl="0" indent="-419100" rtl="0">
-              <a:spcBef>
-                <a:spcPts val="0"/>
-              </a:spcBef>
-              <a:buClr>
-                <a:schemeClr val="lt1"/>
-              </a:buClr>
-              <a:buSzPct val="100000"/>
-              <a:buFont typeface="Arial"/>
-              <a:buChar char="●"/>
-            </a:pPr>
             <a:r>
-              <a:rPr lang="en"/>
-              <a:t>It’s a programming paradigm.</a:t>
+              <a:rPr lang="en" dirty="0"/>
+              <a:t>a programming paradigm.</a:t>
             </a:r>
           </a:p>
         </p:txBody>
@@ -3529,6 +3523,13 @@
   <p:transition xmlns:p14="http://schemas.microsoft.com/office/powerpoint/2010/main" spd="slow">
     <p:cut/>
   </p:transition>
+  <p:timing>
+    <p:tnLst>
+      <p:par>
+        <p:cTn xmlns:p14="http://schemas.microsoft.com/office/powerpoint/2010/main" id="1" dur="indefinite" restart="never" nodeType="tmRoot"/>
+      </p:par>
+    </p:tnLst>
+  </p:timing>
 </p:sld>
 </file>
 
@@ -3724,6 +3725,13 @@
   <p:transition xmlns:p14="http://schemas.microsoft.com/office/powerpoint/2010/main" spd="slow">
     <p:cut/>
   </p:transition>
+  <p:timing>
+    <p:tnLst>
+      <p:par>
+        <p:cTn xmlns:p14="http://schemas.microsoft.com/office/powerpoint/2010/main" id="1" dur="indefinite" restart="never" nodeType="tmRoot"/>
+      </p:par>
+    </p:tnLst>
+  </p:timing>
 </p:sld>
 </file>
 
@@ -3850,6 +3858,13 @@
   <p:transition xmlns:p14="http://schemas.microsoft.com/office/powerpoint/2010/main" spd="slow">
     <p:cut/>
   </p:transition>
+  <p:timing>
+    <p:tnLst>
+      <p:par>
+        <p:cTn xmlns:p14="http://schemas.microsoft.com/office/powerpoint/2010/main" id="1" dur="indefinite" restart="never" nodeType="tmRoot"/>
+      </p:par>
+    </p:tnLst>
+  </p:timing>
 </p:sld>
 </file>
 
@@ -3945,7 +3960,7 @@
               <a:buChar char="●"/>
             </a:pPr>
             <a:r>
-              <a:rPr lang="en"/>
+              <a:rPr lang="en" dirty="0"/>
               <a:t>Wrote a chat client.</a:t>
             </a:r>
           </a:p>
@@ -3962,8 +3977,12 @@
               <a:buChar char="●"/>
             </a:pPr>
             <a:r>
+              <a:rPr lang="en" smtClean="0"/>
+              <a:t>React.js </a:t>
+            </a:r>
+            <a:r>
               <a:rPr lang="en"/>
-              <a:t>React.js and jQuery for behaviors.</a:t>
+              <a:t>for behaviors.</a:t>
             </a:r>
           </a:p>
           <a:p>
@@ -3979,7 +3998,7 @@
               <a:buChar char="●"/>
             </a:pPr>
             <a:r>
-              <a:rPr lang="en"/>
+              <a:rPr lang="en" dirty="0"/>
               <a:t>Highland.js for event handling.</a:t>
             </a:r>
           </a:p>
@@ -3996,7 +4015,7 @@
               <a:buChar char="●"/>
             </a:pPr>
             <a:r>
-              <a:rPr lang="en"/>
+              <a:rPr lang="en" dirty="0"/>
               <a:t>Node.js and Socket.io for the webserver.</a:t>
             </a:r>
           </a:p>
@@ -4010,6 +4029,13 @@
   <p:transition xmlns:p14="http://schemas.microsoft.com/office/powerpoint/2010/main" spd="slow">
     <p:cut/>
   </p:transition>
+  <p:timing>
+    <p:tnLst>
+      <p:par>
+        <p:cTn xmlns:p14="http://schemas.microsoft.com/office/powerpoint/2010/main" id="1" dur="indefinite" restart="never" nodeType="tmRoot"/>
+      </p:par>
+    </p:tnLst>
+  </p:timing>
 </p:sld>
 </file>
 
@@ -4179,6 +4205,13 @@
   <p:transition xmlns:p14="http://schemas.microsoft.com/office/powerpoint/2010/main" spd="slow">
     <p:cut/>
   </p:transition>
+  <p:timing>
+    <p:tnLst>
+      <p:par>
+        <p:cTn xmlns:p14="http://schemas.microsoft.com/office/powerpoint/2010/main" id="1" dur="indefinite" restart="never" nodeType="tmRoot"/>
+      </p:par>
+    </p:tnLst>
+  </p:timing>
 </p:sld>
 </file>
 
@@ -4265,10 +4298,9 @@
               <a:t>chat.herokuapp.com</a:t>
             </a:r>
             <a:r>
-              <a:rPr lang="en-US"/>
+              <a:rPr lang="en-US" dirty="0"/>
               <a:t>/</a:t>
             </a:r>
-            <a:endParaRPr lang="en-US" dirty="0"/>
           </a:p>
           <a:p>
             <a:endParaRPr lang="en-US" dirty="0" smtClean="0"/>
@@ -4285,6 +4317,13 @@
   <p:clrMapOvr>
     <a:masterClrMapping/>
   </p:clrMapOvr>
+  <p:timing>
+    <p:tnLst>
+      <p:par>
+        <p:cTn xmlns:p14="http://schemas.microsoft.com/office/powerpoint/2010/main" id="1" dur="indefinite" restart="never" nodeType="tmRoot"/>
+      </p:par>
+    </p:tnLst>
+  </p:timing>
 </p:sld>
 </file>
 

</xml_diff>